<commit_message>
Agregando métodos de Moving Average a la serie de Demanda electrico y probando modelos SARIMA_parte2.1
</commit_message>
<xml_diff>
--- a/CARTEL_PRONOSTICOS_Modelos_de_pronostico_aplicados_a_ademanda_De_gas_natural_v1.pptx
+++ b/CARTEL_PRONOSTICOS_Modelos_de_pronostico_aplicados_a_ademanda_De_gas_natural_v1.pptx
@@ -285,7 +285,7 @@
       </p15:sldGuideLst>
     </p:ext>
     <p:ext uri="http://customooxmlschemas.google.com/">
-      <go:slidesCustomData xmlns="" xmlns:mc="http://schemas.openxmlformats.org/markup-compatibility/2006" xmlns:mv="urn:schemas-microsoft-com:mac:vml" xmlns:c="http://schemas.openxmlformats.org/drawingml/2006/chart" xmlns:dgm="http://schemas.openxmlformats.org/drawingml/2006/diagram" xmlns:o="urn:schemas-microsoft-com:office:office" xmlns:v="urn:schemas-microsoft-com:vml" xmlns:pvml="urn:schemas-microsoft-com:office:powerpoint" xmlns:com="http://schemas.openxmlformats.org/drawingml/2006/compatibility" xmlns:p14="http://schemas.microsoft.com/office/powerpoint/2010/main" xmlns:p15="http://schemas.microsoft.com/office/powerpoint/2012/main" xmlns:ahyp="http://schemas.microsoft.com/office/drawing/2018/hyperlinkcolor" xmlns:go="http://customooxmlschemas.google.com/" r:id="rId16" roundtripDataSignature="AMtx7miQDVQXGM3vnSjUw7xkqrap4wCZRg=="/>
+      <go:slidesCustomData xmlns:go="http://customooxmlschemas.google.com/" xmlns:ahyp="http://schemas.microsoft.com/office/drawing/2018/hyperlinkcolor" xmlns:p15="http://schemas.microsoft.com/office/powerpoint/2012/main" xmlns:p14="http://schemas.microsoft.com/office/powerpoint/2010/main" xmlns:com="http://schemas.openxmlformats.org/drawingml/2006/compatibility" xmlns:pvml="urn:schemas-microsoft-com:office:powerpoint" xmlns:v="urn:schemas-microsoft-com:vml" xmlns:o="urn:schemas-microsoft-com:office:office" xmlns:dgm="http://schemas.openxmlformats.org/drawingml/2006/diagram" xmlns:c="http://schemas.openxmlformats.org/drawingml/2006/chart" xmlns:mv="urn:schemas-microsoft-com:mac:vml" xmlns:mc="http://schemas.openxmlformats.org/markup-compatibility/2006" xmlns="" r:id="rId16" roundtripDataSignature="AMtx7miQDVQXGM3vnSjUw7xkqrap4wCZRg=="/>
     </p:ext>
   </p:extLst>
 </p:presentation>
@@ -294,7 +294,7 @@
 <file path=ppt/revisionInfo.xml><?xml version="1.0" encoding="utf-8"?>
 <p1510:revInfo xmlns:a="http://schemas.openxmlformats.org/drawingml/2006/main" xmlns:r="http://schemas.openxmlformats.org/officeDocument/2006/relationships" xmlns:p1510="http://schemas.microsoft.com/office/powerpoint/2015/10/main">
   <p1510:revLst>
-    <p1510:client id="{C7CB6346-8C86-415E-914C-0E6252079731}" v="129" dt="2023-05-22T23:36:12.026"/>
+    <p1510:client id="{C7CB6346-8C86-415E-914C-0E6252079731}" v="145" dt="2023-05-23T00:35:21.247"/>
   </p1510:revLst>
 </p1510:revInfo>
 </file>
@@ -304,18 +304,18 @@
   <pc:docChgLst>
     <pc:chgData name="Sergio Ibarra" userId="f9e6e0322c927b48" providerId="LiveId" clId="{C7CB6346-8C86-415E-914C-0E6252079731}"/>
     <pc:docChg chg="undo custSel addSld delSld modSld">
-      <pc:chgData name="Sergio Ibarra" userId="f9e6e0322c927b48" providerId="LiveId" clId="{C7CB6346-8C86-415E-914C-0E6252079731}" dt="2023-05-22T23:36:19.981" v="2396" actId="255"/>
+      <pc:chgData name="Sergio Ibarra" userId="f9e6e0322c927b48" providerId="LiveId" clId="{C7CB6346-8C86-415E-914C-0E6252079731}" dt="2023-05-23T00:36:06.566" v="3279" actId="20577"/>
       <pc:docMkLst>
         <pc:docMk/>
       </pc:docMkLst>
       <pc:sldChg chg="addSp delSp modSp mod">
-        <pc:chgData name="Sergio Ibarra" userId="f9e6e0322c927b48" providerId="LiveId" clId="{C7CB6346-8C86-415E-914C-0E6252079731}" dt="2023-05-22T23:36:19.981" v="2396" actId="255"/>
+        <pc:chgData name="Sergio Ibarra" userId="f9e6e0322c927b48" providerId="LiveId" clId="{C7CB6346-8C86-415E-914C-0E6252079731}" dt="2023-05-23T00:36:06.566" v="3279" actId="20577"/>
         <pc:sldMkLst>
           <pc:docMk/>
           <pc:sldMk cId="2665960598" sldId="261"/>
         </pc:sldMkLst>
         <pc:spChg chg="add mod">
-          <ac:chgData name="Sergio Ibarra" userId="f9e6e0322c927b48" providerId="LiveId" clId="{C7CB6346-8C86-415E-914C-0E6252079731}" dt="2023-05-22T23:10:08.223" v="982" actId="20577"/>
+          <ac:chgData name="Sergio Ibarra" userId="f9e6e0322c927b48" providerId="LiveId" clId="{C7CB6346-8C86-415E-914C-0E6252079731}" dt="2023-05-23T00:35:55.176" v="3276" actId="20577"/>
           <ac:spMkLst>
             <pc:docMk/>
             <pc:sldMk cId="2665960598" sldId="261"/>
@@ -355,6 +355,14 @@
           </ac:spMkLst>
         </pc:spChg>
         <pc:spChg chg="add mod">
+          <ac:chgData name="Sergio Ibarra" userId="f9e6e0322c927b48" providerId="LiveId" clId="{C7CB6346-8C86-415E-914C-0E6252079731}" dt="2023-05-23T00:33:16.268" v="3205" actId="1035"/>
+          <ac:spMkLst>
+            <pc:docMk/>
+            <pc:sldMk cId="2665960598" sldId="261"/>
+            <ac:spMk id="10" creationId="{E31D09DC-CA6D-F7B6-4422-53B4E9DC1709}"/>
+          </ac:spMkLst>
+        </pc:spChg>
+        <pc:spChg chg="add mod">
           <ac:chgData name="Sergio Ibarra" userId="f9e6e0322c927b48" providerId="LiveId" clId="{C7CB6346-8C86-415E-914C-0E6252079731}" dt="2023-05-22T23:08:39.191" v="849" actId="255"/>
           <ac:spMkLst>
             <pc:docMk/>
@@ -386,8 +394,16 @@
             <ac:spMk id="14" creationId="{ED21C892-A308-1335-8AEB-1404693A35E7}"/>
           </ac:spMkLst>
         </pc:spChg>
+        <pc:spChg chg="add del">
+          <ac:chgData name="Sergio Ibarra" userId="f9e6e0322c927b48" providerId="LiveId" clId="{C7CB6346-8C86-415E-914C-0E6252079731}" dt="2023-05-23T00:23:35.406" v="2985"/>
+          <ac:spMkLst>
+            <pc:docMk/>
+            <pc:sldMk cId="2665960598" sldId="261"/>
+            <ac:spMk id="15" creationId="{C979DB36-E341-B2D4-12CE-221F1E305048}"/>
+          </ac:spMkLst>
+        </pc:spChg>
         <pc:spChg chg="mod">
-          <ac:chgData name="Sergio Ibarra" userId="f9e6e0322c927b48" providerId="LiveId" clId="{C7CB6346-8C86-415E-914C-0E6252079731}" dt="2023-05-22T23:22:38.894" v="2048" actId="20577"/>
+          <ac:chgData name="Sergio Ibarra" userId="f9e6e0322c927b48" providerId="LiveId" clId="{C7CB6346-8C86-415E-914C-0E6252079731}" dt="2023-05-23T00:23:53.154" v="3008" actId="1035"/>
           <ac:spMkLst>
             <pc:docMk/>
             <pc:sldMk cId="2665960598" sldId="261"/>
@@ -411,7 +427,7 @@
           </ac:spMkLst>
         </pc:spChg>
         <pc:spChg chg="mod">
-          <ac:chgData name="Sergio Ibarra" userId="f9e6e0322c927b48" providerId="LiveId" clId="{C7CB6346-8C86-415E-914C-0E6252079731}" dt="2023-05-22T23:28:33.882" v="2261" actId="1076"/>
+          <ac:chgData name="Sergio Ibarra" userId="f9e6e0322c927b48" providerId="LiveId" clId="{C7CB6346-8C86-415E-914C-0E6252079731}" dt="2023-05-23T00:17:51.413" v="2442" actId="1036"/>
           <ac:spMkLst>
             <pc:docMk/>
             <pc:sldMk cId="2665960598" sldId="261"/>
@@ -435,11 +451,27 @@
           </ac:spMkLst>
         </pc:spChg>
         <pc:spChg chg="add mod">
+          <ac:chgData name="Sergio Ibarra" userId="f9e6e0322c927b48" providerId="LiveId" clId="{C7CB6346-8C86-415E-914C-0E6252079731}" dt="2023-05-23T00:24:16.849" v="3101" actId="20577"/>
+          <ac:spMkLst>
+            <pc:docMk/>
+            <pc:sldMk cId="2665960598" sldId="261"/>
+            <ac:spMk id="24" creationId="{7CBE814C-C2C1-C771-09A0-9ED1B84C585A}"/>
+          </ac:spMkLst>
+        </pc:spChg>
+        <pc:spChg chg="add mod">
           <ac:chgData name="Sergio Ibarra" userId="f9e6e0322c927b48" providerId="LiveId" clId="{C7CB6346-8C86-415E-914C-0E6252079731}" dt="2023-05-22T23:36:12.026" v="2395" actId="571"/>
           <ac:spMkLst>
             <pc:docMk/>
             <pc:sldMk cId="2665960598" sldId="261"/>
             <ac:spMk id="24" creationId="{C209CF97-751C-D775-6C29-0E781E1537B3}"/>
+          </ac:spMkLst>
+        </pc:spChg>
+        <pc:spChg chg="add del">
+          <ac:chgData name="Sergio Ibarra" userId="f9e6e0322c927b48" providerId="LiveId" clId="{C7CB6346-8C86-415E-914C-0E6252079731}" dt="2023-05-23T00:31:49.460" v="3153"/>
+          <ac:spMkLst>
+            <pc:docMk/>
+            <pc:sldMk cId="2665960598" sldId="261"/>
+            <ac:spMk id="25" creationId="{BD6D1075-2EF5-8292-F719-21F5FE26EC22}"/>
           </ac:spMkLst>
         </pc:spChg>
         <pc:spChg chg="add mod">
@@ -458,8 +490,16 @@
             <ac:spMk id="26" creationId="{5EEA259A-F6ED-46B5-2FAD-2F0E9F782435}"/>
           </ac:spMkLst>
         </pc:spChg>
+        <pc:spChg chg="add del">
+          <ac:chgData name="Sergio Ibarra" userId="f9e6e0322c927b48" providerId="LiveId" clId="{C7CB6346-8C86-415E-914C-0E6252079731}" dt="2023-05-23T00:34:13.864" v="3211"/>
+          <ac:spMkLst>
+            <pc:docMk/>
+            <pc:sldMk cId="2665960598" sldId="261"/>
+            <ac:spMk id="28" creationId="{663A8D14-4DD9-28BE-AA36-4D71A9016F6C}"/>
+          </ac:spMkLst>
+        </pc:spChg>
         <pc:spChg chg="mod">
-          <ac:chgData name="Sergio Ibarra" userId="f9e6e0322c927b48" providerId="LiveId" clId="{C7CB6346-8C86-415E-914C-0E6252079731}" dt="2023-05-22T23:35:05.134" v="2284" actId="255"/>
+          <ac:chgData name="Sergio Ibarra" userId="f9e6e0322c927b48" providerId="LiveId" clId="{C7CB6346-8C86-415E-914C-0E6252079731}" dt="2023-05-23T00:36:06.566" v="3279" actId="20577"/>
           <ac:spMkLst>
             <pc:docMk/>
             <pc:sldMk cId="2665960598" sldId="261"/>
@@ -499,11 +539,27 @@
           </ac:spMkLst>
         </pc:spChg>
         <pc:graphicFrameChg chg="add mod modGraphic">
-          <ac:chgData name="Sergio Ibarra" userId="f9e6e0322c927b48" providerId="LiveId" clId="{C7CB6346-8C86-415E-914C-0E6252079731}" dt="2023-05-22T23:34:30.841" v="2281" actId="242"/>
+          <ac:chgData name="Sergio Ibarra" userId="f9e6e0322c927b48" providerId="LiveId" clId="{C7CB6346-8C86-415E-914C-0E6252079731}" dt="2023-05-23T00:32:54.396" v="3192" actId="798"/>
+          <ac:graphicFrameMkLst>
+            <pc:docMk/>
+            <pc:sldMk cId="2665960598" sldId="261"/>
+            <ac:graphicFrameMk id="3" creationId="{5BC660B6-2C8F-8E9E-81B6-631505EC40D0}"/>
+          </ac:graphicFrameMkLst>
+        </pc:graphicFrameChg>
+        <pc:graphicFrameChg chg="add mod modGraphic">
+          <ac:chgData name="Sergio Ibarra" userId="f9e6e0322c927b48" providerId="LiveId" clId="{C7CB6346-8C86-415E-914C-0E6252079731}" dt="2023-05-23T00:33:13.396" v="3197" actId="14734"/>
           <ac:graphicFrameMkLst>
             <pc:docMk/>
             <pc:sldMk cId="2665960598" sldId="261"/>
             <ac:graphicFrameMk id="21" creationId="{421322DC-8416-44B8-2045-6A0EB727BEF3}"/>
+          </ac:graphicFrameMkLst>
+        </pc:graphicFrameChg>
+        <pc:graphicFrameChg chg="add mod">
+          <ac:chgData name="Sergio Ibarra" userId="f9e6e0322c927b48" providerId="LiveId" clId="{C7CB6346-8C86-415E-914C-0E6252079731}" dt="2023-05-23T00:33:36.348" v="3209" actId="1076"/>
+          <ac:graphicFrameMkLst>
+            <pc:docMk/>
+            <pc:sldMk cId="2665960598" sldId="261"/>
+            <ac:graphicFrameMk id="27" creationId="{D68613D7-43F0-5A0A-549B-53678FA049F6}"/>
           </ac:graphicFrameMkLst>
         </pc:graphicFrameChg>
         <pc:picChg chg="add del mod">
@@ -512,6 +568,38 @@
             <pc:docMk/>
             <pc:sldMk cId="2665960598" sldId="261"/>
             <ac:picMk id="3" creationId="{BFFED6B9-2811-F6D9-E119-E58773031CB2}"/>
+          </ac:picMkLst>
+        </pc:picChg>
+        <pc:picChg chg="add mod">
+          <ac:chgData name="Sergio Ibarra" userId="f9e6e0322c927b48" providerId="LiveId" clId="{C7CB6346-8C86-415E-914C-0E6252079731}" dt="2023-05-23T00:31:05.872" v="3151" actId="1076"/>
+          <ac:picMkLst>
+            <pc:docMk/>
+            <pc:sldMk cId="2665960598" sldId="261"/>
+            <ac:picMk id="23" creationId="{D6FE2684-77EE-2067-B077-11BFBAC9055A}"/>
+          </ac:picMkLst>
+        </pc:picChg>
+        <pc:picChg chg="add mod">
+          <ac:chgData name="Sergio Ibarra" userId="f9e6e0322c927b48" providerId="LiveId" clId="{C7CB6346-8C86-415E-914C-0E6252079731}" dt="2023-05-23T00:32:04.098" v="3162" actId="14100"/>
+          <ac:picMkLst>
+            <pc:docMk/>
+            <pc:sldMk cId="2665960598" sldId="261"/>
+            <ac:picMk id="26" creationId="{92682CCC-7BDD-9EC6-A2C5-280F5D47A56E}"/>
+          </ac:picMkLst>
+        </pc:picChg>
+        <pc:picChg chg="add mod">
+          <ac:chgData name="Sergio Ibarra" userId="f9e6e0322c927b48" providerId="LiveId" clId="{C7CB6346-8C86-415E-914C-0E6252079731}" dt="2023-05-23T00:34:37.023" v="3251" actId="1038"/>
+          <ac:picMkLst>
+            <pc:docMk/>
+            <pc:sldMk cId="2665960598" sldId="261"/>
+            <ac:picMk id="29" creationId="{7D11C574-02AA-0CE4-D5E8-3638F6E7B7A6}"/>
+          </ac:picMkLst>
+        </pc:picChg>
+        <pc:picChg chg="add mod">
+          <ac:chgData name="Sergio Ibarra" userId="f9e6e0322c927b48" providerId="LiveId" clId="{C7CB6346-8C86-415E-914C-0E6252079731}" dt="2023-05-23T00:35:44.282" v="3273" actId="1076"/>
+          <ac:picMkLst>
+            <pc:docMk/>
+            <pc:sldMk cId="2665960598" sldId="261"/>
+            <ac:picMk id="30" creationId="{B31A265C-E064-621B-AC24-CEB05D6A73D6}"/>
           </ac:picMkLst>
         </pc:picChg>
       </pc:sldChg>
@@ -13201,7 +13289,7 @@
                 <a:cs typeface="Encode Sans ExtraLight"/>
                 <a:sym typeface="Encode Sans ExtraLight"/>
               </a:rPr>
-              <a:t>Demostrar la aplicación de distintos modelos de pronóstico para el caso de la demanda de Gas Natural en el sector eléctrico mexicano. </a:t>
+              <a:t>Demostrar la aplicación de distintos modelos de pronóstico para el caso de la demanda de Gas Natural en el sector eléctrico mexicano.</a:t>
             </a:r>
             <a:endParaRPr sz="1000" dirty="0">
               <a:solidFill>
@@ -14247,8 +14335,8 @@
         </p:nvSpPr>
         <p:spPr>
           <a:xfrm>
-            <a:off x="333675" y="7805959"/>
-            <a:ext cx="4481669" cy="710582"/>
+            <a:off x="416898" y="8861383"/>
+            <a:ext cx="4481669" cy="587258"/>
           </a:xfrm>
           <a:prstGeom prst="rect">
             <a:avLst/>
@@ -14893,7 +14981,7 @@
         </p:nvSpPr>
         <p:spPr>
           <a:xfrm>
-            <a:off x="378293" y="10435681"/>
+            <a:off x="378293" y="10039441"/>
             <a:ext cx="4357658" cy="695963"/>
           </a:xfrm>
           <a:prstGeom prst="rect">
@@ -15255,7 +15343,7 @@
                 </a:solidFill>
                 <a:latin typeface="+mn-lt"/>
               </a:rPr>
-              <a:t>Los modelos de series de tiempo donde las variables xi son los valores de la misma variable y, pero a tiempo t-s, donde s es un “</a:t>
+              <a:t>B) Los modelos de series de tiempo donde las variables xi son los valores de la misma variable y, pero a tiempo t-s, donde s es un “</a:t>
             </a:r>
             <a:r>
               <a:rPr lang="es-MX" sz="1000" dirty="0" err="1">
@@ -15296,8 +15384,8 @@
           </a:p>
         </p:txBody>
       </p:sp>
-      <mc:AlternateContent xmlns:mc="http://schemas.openxmlformats.org/markup-compatibility/2006">
-        <mc:Choice xmlns:a14="http://schemas.microsoft.com/office/drawing/2010/main" Requires="a14">
+      <mc:AlternateContent xmlns:mc="http://schemas.openxmlformats.org/markup-compatibility/2006" xmlns:a14="http://schemas.microsoft.com/office/drawing/2010/main">
+        <mc:Choice Requires="a14">
           <p:sp>
             <p:nvSpPr>
               <p:cNvPr id="4" name="Google Shape;89;p1">
@@ -15354,7 +15442,7 @@
                         <a:solidFill>
                           <a:schemeClr val="tx1"/>
                         </a:solidFill>
-                        <a:latin typeface="+mn-lt"/>
+                        <a:latin typeface="Cambria Math" panose="02040503050406030204" pitchFamily="18" charset="0"/>
                       </a:rPr>
                       <m:t>=</m:t>
                     </m:r>
@@ -15363,7 +15451,7 @@
                         <a:solidFill>
                           <a:schemeClr val="tx1"/>
                         </a:solidFill>
-                        <a:latin typeface="+mn-lt"/>
+                        <a:latin typeface="Cambria Math" panose="02040503050406030204" pitchFamily="18" charset="0"/>
                       </a:rPr>
                       <m:t>𝑐</m:t>
                     </m:r>
@@ -15372,7 +15460,7 @@
                         <a:solidFill>
                           <a:schemeClr val="tx1"/>
                         </a:solidFill>
-                        <a:latin typeface="+mn-lt"/>
+                        <a:latin typeface="Cambria Math" panose="02040503050406030204" pitchFamily="18" charset="0"/>
                       </a:rPr>
                       <m:t>+ </m:t>
                     </m:r>
@@ -15381,7 +15469,7 @@
                         <a:solidFill>
                           <a:schemeClr val="tx1"/>
                         </a:solidFill>
-                        <a:latin typeface="+mn-lt"/>
+                        <a:latin typeface="Cambria Math" panose="02040503050406030204" pitchFamily="18" charset="0"/>
                         <a:ea typeface="Cambria Math" panose="02040503050406030204" pitchFamily="18" charset="0"/>
                       </a:rPr>
                       <m:t>𝜃</m:t>
@@ -15391,7 +15479,7 @@
                         <a:solidFill>
                           <a:schemeClr val="tx1"/>
                         </a:solidFill>
-                        <a:latin typeface="+mn-lt"/>
+                        <a:latin typeface="Cambria Math" panose="02040503050406030204" pitchFamily="18" charset="0"/>
                         <a:ea typeface="Cambria Math" panose="02040503050406030204" pitchFamily="18" charset="0"/>
                       </a:rPr>
                       <m:t>1∗</m:t>
@@ -15401,7 +15489,7 @@
                         <a:solidFill>
                           <a:schemeClr val="tx1"/>
                         </a:solidFill>
-                        <a:latin typeface="+mn-lt"/>
+                        <a:latin typeface="Cambria Math" panose="02040503050406030204" pitchFamily="18" charset="0"/>
                         <a:ea typeface="Cambria Math" panose="02040503050406030204" pitchFamily="18" charset="0"/>
                       </a:rPr>
                       <m:t>𝑋𝑡</m:t>
@@ -15411,7 +15499,7 @@
                         <a:solidFill>
                           <a:schemeClr val="tx1"/>
                         </a:solidFill>
-                        <a:latin typeface="+mn-lt"/>
+                        <a:latin typeface="Cambria Math" panose="02040503050406030204" pitchFamily="18" charset="0"/>
                         <a:ea typeface="Cambria Math" panose="02040503050406030204" pitchFamily="18" charset="0"/>
                       </a:rPr>
                       <m:t>−1+</m:t>
@@ -15421,7 +15509,7 @@
                         <a:solidFill>
                           <a:schemeClr val="tx1"/>
                         </a:solidFill>
-                        <a:latin typeface="+mn-lt"/>
+                        <a:latin typeface="Cambria Math" panose="02040503050406030204" pitchFamily="18" charset="0"/>
                         <a:ea typeface="Cambria Math" panose="02040503050406030204" pitchFamily="18" charset="0"/>
                       </a:rPr>
                       <m:t>𝜃</m:t>
@@ -15431,7 +15519,7 @@
                         <a:solidFill>
                           <a:schemeClr val="tx1"/>
                         </a:solidFill>
-                        <a:latin typeface="+mn-lt"/>
+                        <a:latin typeface="Cambria Math" panose="02040503050406030204" pitchFamily="18" charset="0"/>
                         <a:ea typeface="Cambria Math" panose="02040503050406030204" pitchFamily="18" charset="0"/>
                       </a:rPr>
                       <m:t>2</m:t>
@@ -15441,7 +15529,7 @@
                         <a:solidFill>
                           <a:schemeClr val="tx1"/>
                         </a:solidFill>
-                        <a:latin typeface="+mn-lt"/>
+                        <a:latin typeface="Cambria Math" panose="02040503050406030204" pitchFamily="18" charset="0"/>
                         <a:ea typeface="Cambria Math" panose="02040503050406030204" pitchFamily="18" charset="0"/>
                       </a:rPr>
                       <m:t>∗</m:t>
@@ -15451,7 +15539,7 @@
                         <a:solidFill>
                           <a:schemeClr val="tx1"/>
                         </a:solidFill>
-                        <a:latin typeface="+mn-lt"/>
+                        <a:latin typeface="Cambria Math" panose="02040503050406030204" pitchFamily="18" charset="0"/>
                         <a:ea typeface="Cambria Math" panose="02040503050406030204" pitchFamily="18" charset="0"/>
                       </a:rPr>
                       <m:t>𝑋𝑡</m:t>
@@ -15461,7 +15549,7 @@
                         <a:solidFill>
                           <a:schemeClr val="tx1"/>
                         </a:solidFill>
-                        <a:latin typeface="+mn-lt"/>
+                        <a:latin typeface="Cambria Math" panose="02040503050406030204" pitchFamily="18" charset="0"/>
                         <a:ea typeface="Cambria Math" panose="02040503050406030204" pitchFamily="18" charset="0"/>
                       </a:rPr>
                       <m:t>−2+</m:t>
@@ -15471,7 +15559,7 @@
                         <a:solidFill>
                           <a:schemeClr val="tx1"/>
                         </a:solidFill>
-                        <a:latin typeface="+mn-lt"/>
+                        <a:latin typeface="Cambria Math" panose="02040503050406030204" pitchFamily="18" charset="0"/>
                         <a:ea typeface="Cambria Math" panose="02040503050406030204" pitchFamily="18" charset="0"/>
                       </a:rPr>
                       <m:t>𝜃</m:t>
@@ -15481,7 +15569,7 @@
                         <a:solidFill>
                           <a:schemeClr val="tx1"/>
                         </a:solidFill>
-                        <a:latin typeface="+mn-lt"/>
+                        <a:latin typeface="Cambria Math" panose="02040503050406030204" pitchFamily="18" charset="0"/>
                         <a:ea typeface="Cambria Math" panose="02040503050406030204" pitchFamily="18" charset="0"/>
                       </a:rPr>
                       <m:t>2</m:t>
@@ -15491,7 +15579,7 @@
                         <a:solidFill>
                           <a:schemeClr val="tx1"/>
                         </a:solidFill>
-                        <a:latin typeface="+mn-lt"/>
+                        <a:latin typeface="Cambria Math" panose="02040503050406030204" pitchFamily="18" charset="0"/>
                         <a:ea typeface="Cambria Math" panose="02040503050406030204" pitchFamily="18" charset="0"/>
                       </a:rPr>
                       <m:t>𝜀</m:t>
@@ -15501,7 +15589,7 @@
                         <a:solidFill>
                           <a:schemeClr val="tx1"/>
                         </a:solidFill>
-                        <a:latin typeface="+mn-lt"/>
+                        <a:latin typeface="Cambria Math" panose="02040503050406030204" pitchFamily="18" charset="0"/>
                         <a:ea typeface="Cambria Math" panose="02040503050406030204" pitchFamily="18" charset="0"/>
                       </a:rPr>
                       <m:t>1∗ + </m:t>
@@ -15511,7 +15599,7 @@
                         <a:solidFill>
                           <a:schemeClr val="tx1"/>
                         </a:solidFill>
-                        <a:latin typeface="+mn-lt"/>
+                        <a:latin typeface="Cambria Math" panose="02040503050406030204" pitchFamily="18" charset="0"/>
                         <a:ea typeface="Cambria Math" panose="02040503050406030204" pitchFamily="18" charset="0"/>
                       </a:rPr>
                       <m:t>𝜀</m:t>
@@ -15521,7 +15609,7 @@
                         <a:solidFill>
                           <a:schemeClr val="tx1"/>
                         </a:solidFill>
-                        <a:latin typeface="+mn-lt"/>
+                        <a:latin typeface="Cambria Math" panose="02040503050406030204" pitchFamily="18" charset="0"/>
                         <a:ea typeface="Cambria Math" panose="02040503050406030204" pitchFamily="18" charset="0"/>
                       </a:rPr>
                       <m:t>𝑡</m:t>
@@ -16037,7 +16125,7 @@
                           </a:solidFill>
                           <a:ea typeface="Cambria Math" panose="02040503050406030204" pitchFamily="18" charset="0"/>
                         </a:rPr>
-                        <m:t>-</m:t>
+                        <m:t>−</m:t>
                       </m:r>
                       <m:r>
                         <m:rPr>
@@ -16083,7 +16171,7 @@
             </p:txBody>
           </p:sp>
         </mc:Choice>
-        <mc:Fallback>
+        <mc:Fallback xmlns="">
           <p:sp>
             <p:nvSpPr>
               <p:cNvPr id="4" name="Google Shape;89;p1">
@@ -16131,8 +16219,8 @@
           </p:sp>
         </mc:Fallback>
       </mc:AlternateContent>
-      <mc:AlternateContent xmlns:mc="http://schemas.openxmlformats.org/markup-compatibility/2006">
-        <mc:Choice xmlns:a14="http://schemas.microsoft.com/office/drawing/2010/main" Requires="a14">
+      <mc:AlternateContent xmlns:mc="http://schemas.openxmlformats.org/markup-compatibility/2006" xmlns:a14="http://schemas.microsoft.com/office/drawing/2010/main">
+        <mc:Choice Requires="a14">
           <p:sp>
             <p:nvSpPr>
               <p:cNvPr id="11" name="TextBox 10">
@@ -16189,7 +16277,7 @@
                         <a:solidFill>
                           <a:schemeClr val="dk1"/>
                         </a:solidFill>
-                        <a:latin typeface="+mn-lt"/>
+                        <a:latin typeface="Cambria Math" panose="02040503050406030204" pitchFamily="18" charset="0"/>
                         <a:ea typeface="Encode Sans Thin"/>
                         <a:cs typeface="Encode Sans Thin"/>
                         <a:sym typeface="Encode Sans Thin"/>
@@ -16201,7 +16289,7 @@
                         <a:solidFill>
                           <a:schemeClr val="dk1"/>
                         </a:solidFill>
-                        <a:latin typeface="+mn-lt"/>
+                        <a:latin typeface="Cambria Math" panose="02040503050406030204" pitchFamily="18" charset="0"/>
                         <a:ea typeface="Encode Sans Thin"/>
                         <a:cs typeface="Encode Sans Thin"/>
                         <a:sym typeface="Encode Sans Thin"/>
@@ -16213,7 +16301,7 @@
                         <a:solidFill>
                           <a:schemeClr val="dk1"/>
                         </a:solidFill>
-                        <a:latin typeface="+mn-lt"/>
+                        <a:latin typeface="Cambria Math" panose="02040503050406030204" pitchFamily="18" charset="0"/>
                         <a:ea typeface="Encode Sans Thin"/>
                         <a:cs typeface="Encode Sans Thin"/>
                         <a:sym typeface="Encode Sans Thin"/>
@@ -16225,7 +16313,7 @@
                         <a:solidFill>
                           <a:schemeClr val="dk1"/>
                         </a:solidFill>
-                        <a:latin typeface="+mn-lt"/>
+                        <a:latin typeface="Cambria Math" panose="02040503050406030204" pitchFamily="18" charset="0"/>
                         <a:ea typeface="Encode Sans Thin"/>
                         <a:cs typeface="Encode Sans Thin"/>
                         <a:sym typeface="Encode Sans Thin"/>
@@ -16237,7 +16325,7 @@
                         <a:solidFill>
                           <a:schemeClr val="dk1"/>
                         </a:solidFill>
-                        <a:latin typeface="+mn-lt"/>
+                        <a:latin typeface="Cambria Math" panose="02040503050406030204" pitchFamily="18" charset="0"/>
                         <a:ea typeface="Encode Sans Thin"/>
                         <a:cs typeface="Encode Sans Thin"/>
                         <a:sym typeface="Encode Sans Thin"/>
@@ -16249,7 +16337,7 @@
                         <a:solidFill>
                           <a:schemeClr val="dk1"/>
                         </a:solidFill>
-                        <a:latin typeface="+mn-lt"/>
+                        <a:latin typeface="Cambria Math" panose="02040503050406030204" pitchFamily="18" charset="0"/>
                         <a:ea typeface="Encode Sans Thin"/>
                         <a:cs typeface="Encode Sans Thin"/>
                         <a:sym typeface="Encode Sans Thin"/>
@@ -16261,7 +16349,7 @@
                         <a:solidFill>
                           <a:schemeClr val="dk1"/>
                         </a:solidFill>
-                        <a:latin typeface="+mn-lt"/>
+                        <a:latin typeface="Cambria Math" panose="02040503050406030204" pitchFamily="18" charset="0"/>
                         <a:ea typeface="Encode Sans Thin"/>
                         <a:cs typeface="Encode Sans Thin"/>
                         <a:sym typeface="Encode Sans Thin"/>
@@ -16273,7 +16361,7 @@
                         <a:solidFill>
                           <a:schemeClr val="dk1"/>
                         </a:solidFill>
-                        <a:latin typeface="+mn-lt"/>
+                        <a:latin typeface="Cambria Math" panose="02040503050406030204" pitchFamily="18" charset="0"/>
                         <a:ea typeface="Encode Sans Thin"/>
                         <a:cs typeface="Encode Sans Thin"/>
                         <a:sym typeface="Encode Sans Thin"/>
@@ -16285,7 +16373,7 @@
                         <a:solidFill>
                           <a:schemeClr val="dk1"/>
                         </a:solidFill>
-                        <a:latin typeface="+mn-lt"/>
+                        <a:latin typeface="Cambria Math" panose="02040503050406030204" pitchFamily="18" charset="0"/>
                         <a:ea typeface="Encode Sans Thin"/>
                         <a:cs typeface="Encode Sans Thin"/>
                         <a:sym typeface="Encode Sans Thin"/>
@@ -16297,7 +16385,7 @@
                         <a:solidFill>
                           <a:schemeClr val="dk1"/>
                         </a:solidFill>
-                        <a:latin typeface="+mn-lt"/>
+                        <a:latin typeface="Cambria Math" panose="02040503050406030204" pitchFamily="18" charset="0"/>
                         <a:ea typeface="Encode Sans Thin"/>
                         <a:cs typeface="Encode Sans Thin"/>
                         <a:sym typeface="Encode Sans Thin"/>
@@ -16309,7 +16397,7 @@
                         <a:solidFill>
                           <a:schemeClr val="dk1"/>
                         </a:solidFill>
-                        <a:latin typeface="+mn-lt"/>
+                        <a:latin typeface="Cambria Math" panose="02040503050406030204" pitchFamily="18" charset="0"/>
                         <a:ea typeface="Encode Sans Thin"/>
                         <a:cs typeface="Encode Sans Thin"/>
                         <a:sym typeface="Encode Sans Thin"/>
@@ -16321,7 +16409,7 @@
                         <a:solidFill>
                           <a:schemeClr val="dk1"/>
                         </a:solidFill>
-                        <a:latin typeface="+mn-lt"/>
+                        <a:latin typeface="Cambria Math" panose="02040503050406030204" pitchFamily="18" charset="0"/>
                         <a:ea typeface="Encode Sans Thin"/>
                         <a:cs typeface="Encode Sans Thin"/>
                         <a:sym typeface="Encode Sans Thin"/>
@@ -16333,7 +16421,7 @@
                         <a:solidFill>
                           <a:schemeClr val="dk1"/>
                         </a:solidFill>
-                        <a:latin typeface="+mn-lt"/>
+                        <a:latin typeface="Cambria Math" panose="02040503050406030204" pitchFamily="18" charset="0"/>
                         <a:ea typeface="Encode Sans Thin"/>
                         <a:cs typeface="Encode Sans Thin"/>
                         <a:sym typeface="Encode Sans Thin"/>
@@ -16345,7 +16433,7 @@
                         <a:solidFill>
                           <a:schemeClr val="dk1"/>
                         </a:solidFill>
-                        <a:latin typeface="+mn-lt"/>
+                        <a:latin typeface="Cambria Math" panose="02040503050406030204" pitchFamily="18" charset="0"/>
                         <a:ea typeface="Encode Sans Thin"/>
                         <a:cs typeface="Encode Sans Thin"/>
                         <a:sym typeface="Encode Sans Thin"/>
@@ -16357,7 +16445,7 @@
                         <a:solidFill>
                           <a:schemeClr val="dk1"/>
                         </a:solidFill>
-                        <a:latin typeface="+mn-lt"/>
+                        <a:latin typeface="Cambria Math" panose="02040503050406030204" pitchFamily="18" charset="0"/>
                         <a:ea typeface="Encode Sans Thin"/>
                         <a:cs typeface="Encode Sans Thin"/>
                         <a:sym typeface="Encode Sans Thin"/>
@@ -16369,7 +16457,7 @@
                         <a:solidFill>
                           <a:schemeClr val="dk1"/>
                         </a:solidFill>
-                        <a:latin typeface="+mn-lt"/>
+                        <a:latin typeface="Cambria Math" panose="02040503050406030204" pitchFamily="18" charset="0"/>
                         <a:ea typeface="Encode Sans Thin"/>
                         <a:cs typeface="Encode Sans Thin"/>
                         <a:sym typeface="Encode Sans Thin"/>
@@ -16381,7 +16469,7 @@
                         <a:solidFill>
                           <a:schemeClr val="dk1"/>
                         </a:solidFill>
-                        <a:latin typeface="+mn-lt"/>
+                        <a:latin typeface="Cambria Math" panose="02040503050406030204" pitchFamily="18" charset="0"/>
                         <a:ea typeface="Encode Sans Thin"/>
                         <a:cs typeface="Encode Sans Thin"/>
                         <a:sym typeface="Encode Sans Thin"/>
@@ -16393,7 +16481,7 @@
                         <a:solidFill>
                           <a:schemeClr val="dk1"/>
                         </a:solidFill>
-                        <a:latin typeface="+mn-lt"/>
+                        <a:latin typeface="Cambria Math" panose="02040503050406030204" pitchFamily="18" charset="0"/>
                         <a:ea typeface="Encode Sans Thin"/>
                         <a:cs typeface="Encode Sans Thin"/>
                         <a:sym typeface="Encode Sans Thin"/>
@@ -16405,7 +16493,7 @@
                         <a:solidFill>
                           <a:schemeClr val="dk1"/>
                         </a:solidFill>
-                        <a:latin typeface="+mn-lt"/>
+                        <a:latin typeface="Cambria Math" panose="02040503050406030204" pitchFamily="18" charset="0"/>
                         <a:ea typeface="Encode Sans Thin"/>
                         <a:cs typeface="Encode Sans Thin"/>
                         <a:sym typeface="Encode Sans Thin"/>
@@ -16417,7 +16505,7 @@
                         <a:solidFill>
                           <a:schemeClr val="dk1"/>
                         </a:solidFill>
-                        <a:latin typeface="+mn-lt"/>
+                        <a:latin typeface="Cambria Math" panose="02040503050406030204" pitchFamily="18" charset="0"/>
                         <a:ea typeface="Encode Sans Thin"/>
                         <a:cs typeface="Encode Sans Thin"/>
                         <a:sym typeface="Encode Sans Thin"/>
@@ -16429,7 +16517,7 @@
                         <a:solidFill>
                           <a:schemeClr val="dk1"/>
                         </a:solidFill>
-                        <a:latin typeface="+mn-lt"/>
+                        <a:latin typeface="Cambria Math" panose="02040503050406030204" pitchFamily="18" charset="0"/>
                         <a:ea typeface="Encode Sans Thin"/>
                         <a:cs typeface="Encode Sans Thin"/>
                         <a:sym typeface="Encode Sans Thin"/>
@@ -16441,7 +16529,7 @@
                         <a:solidFill>
                           <a:schemeClr val="dk1"/>
                         </a:solidFill>
-                        <a:latin typeface="+mn-lt"/>
+                        <a:latin typeface="Cambria Math" panose="02040503050406030204" pitchFamily="18" charset="0"/>
                         <a:ea typeface="Encode Sans Thin"/>
                         <a:cs typeface="Encode Sans Thin"/>
                         <a:sym typeface="Encode Sans Thin"/>
@@ -16453,7 +16541,7 @@
                         <a:solidFill>
                           <a:schemeClr val="dk1"/>
                         </a:solidFill>
-                        <a:latin typeface="+mn-lt"/>
+                        <a:latin typeface="Cambria Math" panose="02040503050406030204" pitchFamily="18" charset="0"/>
                         <a:ea typeface="Encode Sans Thin"/>
                         <a:cs typeface="Encode Sans Thin"/>
                         <a:sym typeface="Encode Sans Thin"/>
@@ -16465,7 +16553,7 @@
                         <a:solidFill>
                           <a:schemeClr val="dk1"/>
                         </a:solidFill>
-                        <a:latin typeface="+mn-lt"/>
+                        <a:latin typeface="Cambria Math" panose="02040503050406030204" pitchFamily="18" charset="0"/>
                         <a:ea typeface="Encode Sans Thin"/>
                         <a:cs typeface="Encode Sans Thin"/>
                         <a:sym typeface="Encode Sans Thin"/>
@@ -16749,7 +16837,7 @@
             </p:txBody>
           </p:sp>
         </mc:Choice>
-        <mc:Fallback>
+        <mc:Fallback xmlns="">
           <p:sp>
             <p:nvSpPr>
               <p:cNvPr id="11" name="TextBox 10">
@@ -16809,14 +16897,14 @@
           <p:nvPr>
             <p:extLst>
               <p:ext uri="{D42A27DB-BD31-4B8C-83A1-F6EECF244321}">
-                <p14:modId xmlns:p14="http://schemas.microsoft.com/office/powerpoint/2010/main" val="1132740497"/>
+                <p14:modId xmlns:p14="http://schemas.microsoft.com/office/powerpoint/2010/main" val="2182818402"/>
               </p:ext>
             </p:extLst>
           </p:nvPr>
         </p:nvGraphicFramePr>
         <p:xfrm>
-          <a:off x="514086" y="11124469"/>
-          <a:ext cx="4086072" cy="539296"/>
+          <a:off x="514086" y="10728229"/>
+          <a:ext cx="4086072" cy="530676"/>
         </p:xfrm>
         <a:graphic>
           <a:graphicData uri="http://schemas.openxmlformats.org/drawingml/2006/table">
@@ -16825,21 +16913,21 @@
                 <a:tableStyleId>{073A0DAA-6AF3-43AB-8588-CEC1D06C72B9}</a:tableStyleId>
               </a:tblPr>
               <a:tblGrid>
-                <a:gridCol w="1019263">
+                <a:gridCol w="406410">
                   <a:extLst>
                     <a:ext uri="{9D8B030D-6E8A-4147-A177-3AD203B41FA5}">
                       <a16:colId xmlns:a16="http://schemas.microsoft.com/office/drawing/2014/main" val="3883179358"/>
                     </a:ext>
                   </a:extLst>
                 </a:gridCol>
-                <a:gridCol w="1019263">
+                <a:gridCol w="1371600">
                   <a:extLst>
                     <a:ext uri="{9D8B030D-6E8A-4147-A177-3AD203B41FA5}">
                       <a16:colId xmlns:a16="http://schemas.microsoft.com/office/drawing/2014/main" val="3238939105"/>
                     </a:ext>
                   </a:extLst>
                 </a:gridCol>
-                <a:gridCol w="1019263">
+                <a:gridCol w="1279779">
                   <a:extLst>
                     <a:ext uri="{9D8B030D-6E8A-4147-A177-3AD203B41FA5}">
                       <a16:colId xmlns:a16="http://schemas.microsoft.com/office/drawing/2014/main" val="3179396712"/>
@@ -17259,7 +17347,7 @@
                         </a:spcAft>
                       </a:pPr>
                       <a:r>
-                        <a:rPr lang="es-ES" sz="500" dirty="0">
+                        <a:rPr lang="es-ES" sz="500" b="0" dirty="0">
                           <a:solidFill>
                             <a:schemeClr val="tx1"/>
                           </a:solidFill>
@@ -17268,7 +17356,7 @@
                         <a:t>Decaimiento</a:t>
                       </a:r>
                       <a:r>
-                        <a:rPr lang="es-ES" sz="500" spc="-55" dirty="0">
+                        <a:rPr lang="es-ES" sz="500" b="0" spc="-55" dirty="0">
                           <a:solidFill>
                             <a:schemeClr val="tx1"/>
                           </a:solidFill>
@@ -17277,7 +17365,7 @@
                         <a:t> </a:t>
                       </a:r>
                       <a:r>
-                        <a:rPr lang="es-ES" sz="500" dirty="0">
+                        <a:rPr lang="es-ES" sz="500" b="0" dirty="0">
                           <a:solidFill>
                             <a:schemeClr val="tx1"/>
                           </a:solidFill>
@@ -17285,7 +17373,7 @@
                         </a:rPr>
                         <a:t>geométrico</a:t>
                       </a:r>
-                      <a:endParaRPr lang="es-MX" sz="500" dirty="0">
+                      <a:endParaRPr lang="es-MX" sz="500" b="0" dirty="0">
                         <a:solidFill>
                           <a:schemeClr val="tx1"/>
                         </a:solidFill>
@@ -17350,7 +17438,7 @@
                         </a:spcAft>
                       </a:pPr>
                       <a:r>
-                        <a:rPr lang="es-ES" sz="500" dirty="0">
+                        <a:rPr lang="es-ES" sz="500" b="0" dirty="0">
                           <a:solidFill>
                             <a:schemeClr val="tx1"/>
                           </a:solidFill>
@@ -17359,7 +17447,7 @@
                         <a:t>Valor significante en</a:t>
                       </a:r>
                       <a:r>
-                        <a:rPr lang="es-ES" sz="500" spc="5" dirty="0">
+                        <a:rPr lang="es-ES" sz="500" b="0" spc="5" dirty="0">
                           <a:solidFill>
                             <a:schemeClr val="tx1"/>
                           </a:solidFill>
@@ -17368,7 +17456,7 @@
                         <a:t> </a:t>
                       </a:r>
                       <a:r>
-                        <a:rPr lang="es-ES" sz="500" dirty="0">
+                        <a:rPr lang="es-ES" sz="500" b="0" dirty="0">
                           <a:solidFill>
                             <a:schemeClr val="tx1"/>
                           </a:solidFill>
@@ -17377,7 +17465,7 @@
                         <a:t>ciertos</a:t>
                       </a:r>
                       <a:r>
-                        <a:rPr lang="es-ES" sz="500" spc="-25" dirty="0">
+                        <a:rPr lang="es-ES" sz="500" b="0" spc="-25" dirty="0">
                           <a:solidFill>
                             <a:schemeClr val="tx1"/>
                           </a:solidFill>
@@ -17386,7 +17474,7 @@
                         <a:t> </a:t>
                       </a:r>
                       <a:r>
-                        <a:rPr lang="es-ES" sz="500" dirty="0">
+                        <a:rPr lang="es-ES" sz="500" b="0" dirty="0">
                           <a:solidFill>
                             <a:schemeClr val="tx1"/>
                           </a:solidFill>
@@ -17395,7 +17483,7 @@
                         <a:t>valores</a:t>
                       </a:r>
                       <a:r>
-                        <a:rPr lang="es-ES" sz="500" spc="-25" dirty="0">
+                        <a:rPr lang="es-ES" sz="500" b="0" spc="-25" dirty="0">
                           <a:solidFill>
                             <a:schemeClr val="tx1"/>
                           </a:solidFill>
@@ -17404,7 +17492,7 @@
                         <a:t> </a:t>
                       </a:r>
                       <a:r>
-                        <a:rPr lang="es-ES" sz="500" dirty="0">
+                        <a:rPr lang="es-ES" sz="500" b="0" dirty="0">
                           <a:solidFill>
                             <a:schemeClr val="tx1"/>
                           </a:solidFill>
@@ -17413,7 +17501,7 @@
                         <a:t>de</a:t>
                       </a:r>
                       <a:r>
-                        <a:rPr lang="es-ES" sz="500" spc="-20" dirty="0">
+                        <a:rPr lang="es-ES" sz="500" b="0" spc="-20" dirty="0">
                           <a:solidFill>
                             <a:schemeClr val="tx1"/>
                           </a:solidFill>
@@ -17422,7 +17510,7 @@
                         <a:t> </a:t>
                       </a:r>
                       <a:r>
-                        <a:rPr lang="es-ES" sz="500" dirty="0" err="1">
+                        <a:rPr lang="es-ES" sz="500" b="0" dirty="0" err="1">
                           <a:solidFill>
                             <a:schemeClr val="tx1"/>
                           </a:solidFill>
@@ -17431,7 +17519,7 @@
                         <a:t>lag</a:t>
                       </a:r>
                       <a:r>
-                        <a:rPr lang="es-ES" sz="500" spc="-25" dirty="0">
+                        <a:rPr lang="es-ES" sz="500" b="0" spc="-25" dirty="0">
                           <a:solidFill>
                             <a:schemeClr val="tx1"/>
                           </a:solidFill>
@@ -17440,7 +17528,7 @@
                         <a:t> </a:t>
                       </a:r>
                       <a:r>
-                        <a:rPr lang="es-ES" sz="500" dirty="0">
+                        <a:rPr lang="es-ES" sz="500" b="0" dirty="0">
                           <a:solidFill>
                             <a:schemeClr val="tx1"/>
                           </a:solidFill>
@@ -17449,7 +17537,7 @@
                         <a:t>p</a:t>
                       </a:r>
                       <a:r>
-                        <a:rPr lang="es-ES" sz="500" spc="-25" dirty="0">
+                        <a:rPr lang="es-ES" sz="500" b="0" spc="-25" dirty="0">
                           <a:solidFill>
                             <a:schemeClr val="tx1"/>
                           </a:solidFill>
@@ -17458,7 +17546,7 @@
                         <a:t> </a:t>
                       </a:r>
                       <a:r>
-                        <a:rPr lang="es-ES" sz="500" dirty="0">
+                        <a:rPr lang="es-ES" sz="500" b="0" dirty="0">
                           <a:solidFill>
                             <a:schemeClr val="tx1"/>
                           </a:solidFill>
@@ -17467,7 +17555,7 @@
                         <a:t>y</a:t>
                       </a:r>
                       <a:r>
-                        <a:rPr lang="es-ES" sz="500" spc="-210" dirty="0">
+                        <a:rPr lang="es-ES" sz="500" b="0" spc="-210" dirty="0">
                           <a:solidFill>
                             <a:schemeClr val="tx1"/>
                           </a:solidFill>
@@ -17476,7 +17564,7 @@
                         <a:t> </a:t>
                       </a:r>
                       <a:r>
-                        <a:rPr lang="es-ES" sz="500" dirty="0">
+                        <a:rPr lang="es-ES" sz="500" b="0" dirty="0">
                           <a:solidFill>
                             <a:schemeClr val="tx1"/>
                           </a:solidFill>
@@ -17485,7 +17573,7 @@
                         <a:t>posterior corte después</a:t>
                       </a:r>
                       <a:r>
-                        <a:rPr lang="es-ES" sz="500" spc="5" dirty="0">
+                        <a:rPr lang="es-ES" sz="500" b="0" spc="5" dirty="0">
                           <a:solidFill>
                             <a:schemeClr val="tx1"/>
                           </a:solidFill>
@@ -17494,7 +17582,7 @@
                         <a:t> </a:t>
                       </a:r>
                       <a:r>
-                        <a:rPr lang="es-ES" sz="500" dirty="0">
+                        <a:rPr lang="es-ES" sz="500" b="0" dirty="0">
                           <a:solidFill>
                             <a:schemeClr val="tx1"/>
                           </a:solidFill>
@@ -17503,7 +17591,7 @@
                         <a:t>de</a:t>
                       </a:r>
                       <a:r>
-                        <a:rPr lang="es-ES" sz="500" spc="-10" dirty="0">
+                        <a:rPr lang="es-ES" sz="500" b="0" spc="-10" dirty="0">
                           <a:solidFill>
                             <a:schemeClr val="tx1"/>
                           </a:solidFill>
@@ -17512,7 +17600,7 @@
                         <a:t> </a:t>
                       </a:r>
                       <a:r>
-                        <a:rPr lang="es-ES" sz="500" dirty="0" err="1">
+                        <a:rPr lang="es-ES" sz="500" b="0" dirty="0" err="1">
                           <a:solidFill>
                             <a:schemeClr val="tx1"/>
                           </a:solidFill>
@@ -17521,7 +17609,7 @@
                         <a:t>lag</a:t>
                       </a:r>
                       <a:r>
-                        <a:rPr lang="es-ES" sz="500" spc="-5" dirty="0">
+                        <a:rPr lang="es-ES" sz="500" b="0" spc="-5" dirty="0">
                           <a:solidFill>
                             <a:schemeClr val="tx1"/>
                           </a:solidFill>
@@ -17530,7 +17618,7 @@
                         <a:t> </a:t>
                       </a:r>
                       <a:r>
-                        <a:rPr lang="es-ES" sz="500" dirty="0">
+                        <a:rPr lang="es-ES" sz="500" b="0" dirty="0">
                           <a:solidFill>
                             <a:schemeClr val="tx1"/>
                           </a:solidFill>
@@ -17538,7 +17626,7 @@
                         </a:rPr>
                         <a:t>p</a:t>
                       </a:r>
-                      <a:endParaRPr lang="es-MX" sz="500" dirty="0">
+                      <a:endParaRPr lang="es-MX" sz="500" b="0" dirty="0">
                         <a:solidFill>
                           <a:schemeClr val="tx1"/>
                         </a:solidFill>
@@ -17603,7 +17691,7 @@
                         </a:spcAft>
                       </a:pPr>
                       <a:r>
-                        <a:rPr lang="es-ES" sz="500" dirty="0">
+                        <a:rPr lang="es-ES" sz="500" b="0" dirty="0">
                           <a:solidFill>
                             <a:schemeClr val="tx1"/>
                           </a:solidFill>
@@ -17612,7 +17700,7 @@
                         <a:t>Decaimiento</a:t>
                       </a:r>
                       <a:r>
-                        <a:rPr lang="es-ES" sz="500" spc="-55" dirty="0">
+                        <a:rPr lang="es-ES" sz="500" b="0" spc="-55" dirty="0">
                           <a:solidFill>
                             <a:schemeClr val="tx1"/>
                           </a:solidFill>
@@ -17621,7 +17709,7 @@
                         <a:t> </a:t>
                       </a:r>
                       <a:r>
-                        <a:rPr lang="es-ES" sz="500" dirty="0">
+                        <a:rPr lang="es-ES" sz="500" b="0" dirty="0">
                           <a:solidFill>
                             <a:schemeClr val="tx1"/>
                           </a:solidFill>
@@ -17629,7 +17717,7 @@
                         </a:rPr>
                         <a:t>geométrico</a:t>
                       </a:r>
-                      <a:endParaRPr lang="es-MX" sz="500" dirty="0">
+                      <a:endParaRPr lang="es-MX" sz="500" b="0" dirty="0">
                         <a:solidFill>
                           <a:schemeClr val="tx1"/>
                         </a:solidFill>
@@ -17774,7 +17862,7 @@
                         </a:spcAft>
                       </a:pPr>
                       <a:r>
-                        <a:rPr lang="es-ES" sz="500" dirty="0">
+                        <a:rPr lang="es-ES" sz="500" b="0" dirty="0">
                           <a:solidFill>
                             <a:schemeClr val="tx1"/>
                           </a:solidFill>
@@ -17783,7 +17871,7 @@
                         <a:t>Valor significante en</a:t>
                       </a:r>
                       <a:r>
-                        <a:rPr lang="es-ES" sz="500" spc="5" dirty="0">
+                        <a:rPr lang="es-ES" sz="500" b="0" spc="5" dirty="0">
                           <a:solidFill>
                             <a:schemeClr val="tx1"/>
                           </a:solidFill>
@@ -17792,7 +17880,7 @@
                         <a:t> </a:t>
                       </a:r>
                       <a:r>
-                        <a:rPr lang="es-ES" sz="500" dirty="0">
+                        <a:rPr lang="es-ES" sz="500" b="0" dirty="0">
                           <a:solidFill>
                             <a:schemeClr val="tx1"/>
                           </a:solidFill>
@@ -17801,7 +17889,7 @@
                         <a:t>ciertos</a:t>
                       </a:r>
                       <a:r>
-                        <a:rPr lang="es-ES" sz="500" spc="-25" dirty="0">
+                        <a:rPr lang="es-ES" sz="500" b="0" spc="-25" dirty="0">
                           <a:solidFill>
                             <a:schemeClr val="tx1"/>
                           </a:solidFill>
@@ -17810,7 +17898,7 @@
                         <a:t> </a:t>
                       </a:r>
                       <a:r>
-                        <a:rPr lang="es-ES" sz="500" dirty="0">
+                        <a:rPr lang="es-ES" sz="500" b="0" dirty="0">
                           <a:solidFill>
                             <a:schemeClr val="tx1"/>
                           </a:solidFill>
@@ -17819,7 +17907,7 @@
                         <a:t>valores</a:t>
                       </a:r>
                       <a:r>
-                        <a:rPr lang="es-ES" sz="500" spc="-25" dirty="0">
+                        <a:rPr lang="es-ES" sz="500" b="0" spc="-25" dirty="0">
                           <a:solidFill>
                             <a:schemeClr val="tx1"/>
                           </a:solidFill>
@@ -17828,7 +17916,7 @@
                         <a:t> </a:t>
                       </a:r>
                       <a:r>
-                        <a:rPr lang="es-ES" sz="500" dirty="0">
+                        <a:rPr lang="es-ES" sz="500" b="0" dirty="0">
                           <a:solidFill>
                             <a:schemeClr val="tx1"/>
                           </a:solidFill>
@@ -17837,7 +17925,7 @@
                         <a:t>de</a:t>
                       </a:r>
                       <a:r>
-                        <a:rPr lang="es-ES" sz="500" spc="-20" dirty="0">
+                        <a:rPr lang="es-ES" sz="500" b="0" spc="-20" dirty="0">
                           <a:solidFill>
                             <a:schemeClr val="tx1"/>
                           </a:solidFill>
@@ -17846,7 +17934,7 @@
                         <a:t> </a:t>
                       </a:r>
                       <a:r>
-                        <a:rPr lang="es-ES" sz="500" dirty="0" err="1">
+                        <a:rPr lang="es-ES" sz="500" b="0" dirty="0" err="1">
                           <a:solidFill>
                             <a:schemeClr val="tx1"/>
                           </a:solidFill>
@@ -17855,7 +17943,7 @@
                         <a:t>lag</a:t>
                       </a:r>
                       <a:r>
-                        <a:rPr lang="es-ES" sz="500" spc="-25" dirty="0">
+                        <a:rPr lang="es-ES" sz="500" b="0" spc="-25" dirty="0">
                           <a:solidFill>
                             <a:schemeClr val="tx1"/>
                           </a:solidFill>
@@ -17864,7 +17952,7 @@
                         <a:t> </a:t>
                       </a:r>
                       <a:r>
-                        <a:rPr lang="es-ES" sz="500" dirty="0">
+                        <a:rPr lang="es-ES" sz="500" b="0" dirty="0">
                           <a:solidFill>
                             <a:schemeClr val="tx1"/>
                           </a:solidFill>
@@ -17873,7 +17961,7 @@
                         <a:t>p</a:t>
                       </a:r>
                       <a:r>
-                        <a:rPr lang="es-ES" sz="500" spc="-25" dirty="0">
+                        <a:rPr lang="es-ES" sz="500" b="0" spc="-25" dirty="0">
                           <a:solidFill>
                             <a:schemeClr val="tx1"/>
                           </a:solidFill>
@@ -17882,7 +17970,7 @@
                         <a:t> </a:t>
                       </a:r>
                       <a:r>
-                        <a:rPr lang="es-ES" sz="500" dirty="0">
+                        <a:rPr lang="es-ES" sz="500" b="0" dirty="0">
                           <a:solidFill>
                             <a:schemeClr val="tx1"/>
                           </a:solidFill>
@@ -17891,7 +17979,7 @@
                         <a:t>y</a:t>
                       </a:r>
                       <a:r>
-                        <a:rPr lang="es-ES" sz="500" spc="-210" dirty="0">
+                        <a:rPr lang="es-ES" sz="500" b="0" spc="-210" dirty="0">
                           <a:solidFill>
                             <a:schemeClr val="tx1"/>
                           </a:solidFill>
@@ -17900,7 +17988,7 @@
                         <a:t> </a:t>
                       </a:r>
                       <a:r>
-                        <a:rPr lang="es-ES" sz="500" dirty="0">
+                        <a:rPr lang="es-ES" sz="500" b="0" dirty="0">
                           <a:solidFill>
                             <a:schemeClr val="tx1"/>
                           </a:solidFill>
@@ -17909,7 +17997,7 @@
                         <a:t>posterior corte después</a:t>
                       </a:r>
                       <a:r>
-                        <a:rPr lang="es-ES" sz="500" spc="5" dirty="0">
+                        <a:rPr lang="es-ES" sz="500" b="0" spc="5" dirty="0">
                           <a:solidFill>
                             <a:schemeClr val="tx1"/>
                           </a:solidFill>
@@ -17918,7 +18006,7 @@
                         <a:t> </a:t>
                       </a:r>
                       <a:r>
-                        <a:rPr lang="es-ES" sz="500" dirty="0">
+                        <a:rPr lang="es-ES" sz="500" b="0" dirty="0">
                           <a:solidFill>
                             <a:schemeClr val="tx1"/>
                           </a:solidFill>
@@ -17927,7 +18015,7 @@
                         <a:t>de</a:t>
                       </a:r>
                       <a:r>
-                        <a:rPr lang="es-ES" sz="500" spc="-10" dirty="0">
+                        <a:rPr lang="es-ES" sz="500" b="0" spc="-10" dirty="0">
                           <a:solidFill>
                             <a:schemeClr val="tx1"/>
                           </a:solidFill>
@@ -17936,7 +18024,7 @@
                         <a:t> </a:t>
                       </a:r>
                       <a:r>
-                        <a:rPr lang="es-ES" sz="500" dirty="0" err="1">
+                        <a:rPr lang="es-ES" sz="500" b="0" dirty="0" err="1">
                           <a:solidFill>
                             <a:schemeClr val="tx1"/>
                           </a:solidFill>
@@ -17945,7 +18033,7 @@
                         <a:t>lag</a:t>
                       </a:r>
                       <a:r>
-                        <a:rPr lang="es-ES" sz="500" spc="-5" dirty="0">
+                        <a:rPr lang="es-ES" sz="500" b="0" spc="-5" dirty="0">
                           <a:solidFill>
                             <a:schemeClr val="tx1"/>
                           </a:solidFill>
@@ -17954,7 +18042,7 @@
                         <a:t> </a:t>
                       </a:r>
                       <a:r>
-                        <a:rPr lang="es-ES" sz="500" dirty="0">
+                        <a:rPr lang="es-ES" sz="500" b="0" dirty="0">
                           <a:solidFill>
                             <a:schemeClr val="tx1"/>
                           </a:solidFill>
@@ -17962,7 +18050,7 @@
                         </a:rPr>
                         <a:t>p</a:t>
                       </a:r>
-                      <a:endParaRPr lang="es-MX" sz="500" dirty="0">
+                      <a:endParaRPr lang="es-MX" sz="500" b="0" dirty="0">
                         <a:solidFill>
                           <a:schemeClr val="tx1"/>
                         </a:solidFill>
@@ -18027,7 +18115,7 @@
                         </a:spcAft>
                       </a:pPr>
                       <a:r>
-                        <a:rPr lang="es-ES" sz="500" dirty="0">
+                        <a:rPr lang="es-ES" sz="500" b="0" dirty="0">
                           <a:solidFill>
                             <a:schemeClr val="tx1"/>
                           </a:solidFill>
@@ -18036,7 +18124,7 @@
                         <a:t>Decaimiento</a:t>
                       </a:r>
                       <a:r>
-                        <a:rPr lang="es-ES" sz="500" spc="-55" dirty="0">
+                        <a:rPr lang="es-ES" sz="500" b="0" spc="-55" dirty="0">
                           <a:solidFill>
                             <a:schemeClr val="tx1"/>
                           </a:solidFill>
@@ -18045,7 +18133,7 @@
                         <a:t> </a:t>
                       </a:r>
                       <a:r>
-                        <a:rPr lang="es-ES" sz="500" dirty="0">
+                        <a:rPr lang="es-ES" sz="500" b="0" dirty="0">
                           <a:solidFill>
                             <a:schemeClr val="tx1"/>
                           </a:solidFill>
@@ -18053,7 +18141,7 @@
                         </a:rPr>
                         <a:t>geométrico</a:t>
                       </a:r>
-                      <a:endParaRPr lang="es-MX" sz="500" dirty="0">
+                      <a:endParaRPr lang="es-MX" sz="500" b="0" dirty="0">
                         <a:solidFill>
                           <a:schemeClr val="tx1"/>
                         </a:solidFill>
@@ -18118,7 +18206,7 @@
                         </a:spcAft>
                       </a:pPr>
                       <a:r>
-                        <a:rPr lang="es-ES" sz="500" dirty="0">
+                        <a:rPr lang="es-ES" sz="500" b="0" dirty="0">
                           <a:solidFill>
                             <a:schemeClr val="tx1"/>
                           </a:solidFill>
@@ -18127,7 +18215,7 @@
                         <a:t>Decaimiento</a:t>
                       </a:r>
                       <a:r>
-                        <a:rPr lang="es-ES" sz="500" spc="-55" dirty="0">
+                        <a:rPr lang="es-ES" sz="500" b="0" spc="-55" dirty="0">
                           <a:solidFill>
                             <a:schemeClr val="tx1"/>
                           </a:solidFill>
@@ -18136,7 +18224,7 @@
                         <a:t> </a:t>
                       </a:r>
                       <a:r>
-                        <a:rPr lang="es-ES" sz="500" dirty="0">
+                        <a:rPr lang="es-ES" sz="500" b="0" dirty="0">
                           <a:solidFill>
                             <a:schemeClr val="tx1"/>
                           </a:solidFill>
@@ -18144,7 +18232,7 @@
                         </a:rPr>
                         <a:t>geométrico</a:t>
                       </a:r>
-                      <a:endParaRPr lang="es-MX" sz="500" dirty="0">
+                      <a:endParaRPr lang="es-MX" sz="500" b="0" dirty="0">
                         <a:solidFill>
                           <a:schemeClr val="tx1"/>
                         </a:solidFill>
@@ -18205,6 +18293,1784 @@
           </a:graphicData>
         </a:graphic>
       </p:graphicFrame>
+      <p:graphicFrame>
+        <p:nvGraphicFramePr>
+          <p:cNvPr id="3" name="Table 2">
+            <a:extLst>
+              <a:ext uri="{FF2B5EF4-FFF2-40B4-BE49-F238E27FC236}">
+                <a16:creationId xmlns:a16="http://schemas.microsoft.com/office/drawing/2014/main" id="{5BC660B6-2C8F-8E9E-81B6-631505EC40D0}"/>
+              </a:ext>
+            </a:extLst>
+          </p:cNvPr>
+          <p:cNvGraphicFramePr>
+            <a:graphicFrameLocks noGrp="1"/>
+          </p:cNvGraphicFramePr>
+          <p:nvPr>
+            <p:extLst>
+              <p:ext uri="{D42A27DB-BD31-4B8C-83A1-F6EECF244321}">
+                <p14:modId xmlns:p14="http://schemas.microsoft.com/office/powerpoint/2010/main" val="1126626118"/>
+              </p:ext>
+            </p:extLst>
+          </p:nvPr>
+        </p:nvGraphicFramePr>
+        <p:xfrm>
+          <a:off x="693340" y="9503910"/>
+          <a:ext cx="3727563" cy="407224"/>
+        </p:xfrm>
+        <a:graphic>
+          <a:graphicData uri="http://schemas.openxmlformats.org/drawingml/2006/table">
+            <a:tbl>
+              <a:tblPr firstRow="1" firstCol="1" lastRow="1" lastCol="1" bandRow="1" bandCol="1">
+                <a:tableStyleId>{073A0DAA-6AF3-43AB-8588-CEC1D06C72B9}</a:tableStyleId>
+              </a:tblPr>
+              <a:tblGrid>
+                <a:gridCol w="1775540">
+                  <a:extLst>
+                    <a:ext uri="{9D8B030D-6E8A-4147-A177-3AD203B41FA5}">
+                      <a16:colId xmlns:a16="http://schemas.microsoft.com/office/drawing/2014/main" val="3883179358"/>
+                    </a:ext>
+                  </a:extLst>
+                </a:gridCol>
+                <a:gridCol w="617220">
+                  <a:extLst>
+                    <a:ext uri="{9D8B030D-6E8A-4147-A177-3AD203B41FA5}">
+                      <a16:colId xmlns:a16="http://schemas.microsoft.com/office/drawing/2014/main" val="3238939105"/>
+                    </a:ext>
+                  </a:extLst>
+                </a:gridCol>
+                <a:gridCol w="1334803">
+                  <a:extLst>
+                    <a:ext uri="{9D8B030D-6E8A-4147-A177-3AD203B41FA5}">
+                      <a16:colId xmlns:a16="http://schemas.microsoft.com/office/drawing/2014/main" val="3179396712"/>
+                    </a:ext>
+                  </a:extLst>
+                </a:gridCol>
+              </a:tblGrid>
+              <a:tr h="67256">
+                <a:tc>
+                  <a:txBody>
+                    <a:bodyPr/>
+                    <a:lstStyle/>
+                    <a:p>
+                      <a:pPr marL="0" marR="0">
+                        <a:spcBef>
+                          <a:spcPts val="0"/>
+                        </a:spcBef>
+                        <a:spcAft>
+                          <a:spcPts val="0"/>
+                        </a:spcAft>
+                      </a:pPr>
+                      <a:r>
+                        <a:rPr lang="es-ES" sz="500" dirty="0">
+                          <a:solidFill>
+                            <a:schemeClr val="tx1"/>
+                          </a:solidFill>
+                          <a:effectLst/>
+                        </a:rPr>
+                        <a:t> Modelo</a:t>
+                      </a:r>
+                      <a:endParaRPr lang="es-MX" sz="500" dirty="0">
+                        <a:solidFill>
+                          <a:schemeClr val="tx1"/>
+                        </a:solidFill>
+                        <a:effectLst/>
+                        <a:latin typeface="Calibri" panose="020F0502020204030204" pitchFamily="34" charset="0"/>
+                        <a:ea typeface="Calibri" panose="020F0502020204030204" pitchFamily="34" charset="0"/>
+                        <a:cs typeface="Times New Roman" panose="02020603050405020304" pitchFamily="18" charset="0"/>
+                      </a:endParaRPr>
+                    </a:p>
+                  </a:txBody>
+                  <a:tcPr marL="0" marR="0" marT="0" marB="0">
+                    <a:lnL w="12700" cap="flat" cmpd="sng" algn="ctr">
+                      <a:solidFill>
+                        <a:schemeClr val="tx1"/>
+                      </a:solidFill>
+                      <a:prstDash val="solid"/>
+                      <a:round/>
+                      <a:headEnd type="none" w="med" len="med"/>
+                      <a:tailEnd type="none" w="med" len="med"/>
+                    </a:lnL>
+                    <a:lnR w="12700" cap="flat" cmpd="sng" algn="ctr">
+                      <a:solidFill>
+                        <a:schemeClr val="tx1"/>
+                      </a:solidFill>
+                      <a:prstDash val="solid"/>
+                      <a:round/>
+                      <a:headEnd type="none" w="med" len="med"/>
+                      <a:tailEnd type="none" w="med" len="med"/>
+                    </a:lnR>
+                    <a:lnT w="12700" cap="flat" cmpd="sng" algn="ctr">
+                      <a:solidFill>
+                        <a:schemeClr val="tx1"/>
+                      </a:solidFill>
+                      <a:prstDash val="solid"/>
+                      <a:round/>
+                      <a:headEnd type="none" w="med" len="med"/>
+                      <a:tailEnd type="none" w="med" len="med"/>
+                    </a:lnT>
+                    <a:lnB w="12700" cap="flat" cmpd="sng" algn="ctr">
+                      <a:solidFill>
+                        <a:schemeClr val="tx1"/>
+                      </a:solidFill>
+                      <a:prstDash val="solid"/>
+                      <a:round/>
+                      <a:headEnd type="none" w="med" len="med"/>
+                      <a:tailEnd type="none" w="med" len="med"/>
+                    </a:lnB>
+                    <a:noFill/>
+                  </a:tcPr>
+                </a:tc>
+                <a:tc>
+                  <a:txBody>
+                    <a:bodyPr/>
+                    <a:lstStyle/>
+                    <a:p>
+                      <a:pPr marL="60325" marR="0">
+                        <a:spcBef>
+                          <a:spcPts val="560"/>
+                        </a:spcBef>
+                        <a:spcAft>
+                          <a:spcPts val="0"/>
+                        </a:spcAft>
+                      </a:pPr>
+                      <a:r>
+                        <a:rPr lang="es-ES" sz="500" dirty="0">
+                          <a:solidFill>
+                            <a:schemeClr val="tx1"/>
+                          </a:solidFill>
+                          <a:effectLst/>
+                          <a:latin typeface="Calibri" panose="020F0502020204030204" pitchFamily="34" charset="0"/>
+                          <a:ea typeface="Calibri" panose="020F0502020204030204" pitchFamily="34" charset="0"/>
+                          <a:cs typeface="Times New Roman" panose="02020603050405020304" pitchFamily="18" charset="0"/>
+                        </a:rPr>
+                        <a:t>MAPE</a:t>
+                      </a:r>
+                      <a:endParaRPr lang="es-MX" sz="500" dirty="0">
+                        <a:solidFill>
+                          <a:schemeClr val="tx1"/>
+                        </a:solidFill>
+                        <a:effectLst/>
+                        <a:latin typeface="Calibri" panose="020F0502020204030204" pitchFamily="34" charset="0"/>
+                        <a:ea typeface="Calibri" panose="020F0502020204030204" pitchFamily="34" charset="0"/>
+                        <a:cs typeface="Times New Roman" panose="02020603050405020304" pitchFamily="18" charset="0"/>
+                      </a:endParaRPr>
+                    </a:p>
+                  </a:txBody>
+                  <a:tcPr marL="0" marR="0" marT="0" marB="0">
+                    <a:lnL w="12700" cap="flat" cmpd="sng" algn="ctr">
+                      <a:solidFill>
+                        <a:schemeClr val="tx1"/>
+                      </a:solidFill>
+                      <a:prstDash val="solid"/>
+                      <a:round/>
+                      <a:headEnd type="none" w="med" len="med"/>
+                      <a:tailEnd type="none" w="med" len="med"/>
+                    </a:lnL>
+                    <a:lnR w="12700" cap="flat" cmpd="sng" algn="ctr">
+                      <a:solidFill>
+                        <a:schemeClr val="tx1"/>
+                      </a:solidFill>
+                      <a:prstDash val="solid"/>
+                      <a:round/>
+                      <a:headEnd type="none" w="med" len="med"/>
+                      <a:tailEnd type="none" w="med" len="med"/>
+                    </a:lnR>
+                    <a:lnT w="12700" cap="flat" cmpd="sng" algn="ctr">
+                      <a:solidFill>
+                        <a:schemeClr val="tx1"/>
+                      </a:solidFill>
+                      <a:prstDash val="solid"/>
+                      <a:round/>
+                      <a:headEnd type="none" w="med" len="med"/>
+                      <a:tailEnd type="none" w="med" len="med"/>
+                    </a:lnT>
+                    <a:lnB w="12700" cap="flat" cmpd="sng" algn="ctr">
+                      <a:solidFill>
+                        <a:schemeClr val="tx1"/>
+                      </a:solidFill>
+                      <a:prstDash val="solid"/>
+                      <a:round/>
+                      <a:headEnd type="none" w="med" len="med"/>
+                      <a:tailEnd type="none" w="med" len="med"/>
+                    </a:lnB>
+                    <a:noFill/>
+                  </a:tcPr>
+                </a:tc>
+                <a:tc>
+                  <a:txBody>
+                    <a:bodyPr/>
+                    <a:lstStyle/>
+                    <a:p>
+                      <a:pPr marL="63500" marR="0">
+                        <a:spcBef>
+                          <a:spcPts val="560"/>
+                        </a:spcBef>
+                        <a:spcAft>
+                          <a:spcPts val="0"/>
+                        </a:spcAft>
+                      </a:pPr>
+                      <a:r>
+                        <a:rPr lang="es-ES" sz="500" dirty="0">
+                          <a:solidFill>
+                            <a:schemeClr val="tx1"/>
+                          </a:solidFill>
+                          <a:effectLst/>
+                          <a:latin typeface="Calibri" panose="020F0502020204030204" pitchFamily="34" charset="0"/>
+                          <a:ea typeface="Calibri" panose="020F0502020204030204" pitchFamily="34" charset="0"/>
+                          <a:cs typeface="Times New Roman" panose="02020603050405020304" pitchFamily="18" charset="0"/>
+                        </a:rPr>
+                        <a:t>Comentario(s)</a:t>
+                      </a:r>
+                      <a:endParaRPr lang="es-MX" sz="500" dirty="0">
+                        <a:solidFill>
+                          <a:schemeClr val="tx1"/>
+                        </a:solidFill>
+                        <a:effectLst/>
+                        <a:latin typeface="Calibri" panose="020F0502020204030204" pitchFamily="34" charset="0"/>
+                        <a:ea typeface="Calibri" panose="020F0502020204030204" pitchFamily="34" charset="0"/>
+                        <a:cs typeface="Times New Roman" panose="02020603050405020304" pitchFamily="18" charset="0"/>
+                      </a:endParaRPr>
+                    </a:p>
+                  </a:txBody>
+                  <a:tcPr marL="0" marR="0" marT="0" marB="0">
+                    <a:lnL w="12700" cap="flat" cmpd="sng" algn="ctr">
+                      <a:solidFill>
+                        <a:schemeClr val="tx1"/>
+                      </a:solidFill>
+                      <a:prstDash val="solid"/>
+                      <a:round/>
+                      <a:headEnd type="none" w="med" len="med"/>
+                      <a:tailEnd type="none" w="med" len="med"/>
+                    </a:lnL>
+                    <a:lnR w="12700" cap="flat" cmpd="sng" algn="ctr">
+                      <a:solidFill>
+                        <a:schemeClr val="tx1"/>
+                      </a:solidFill>
+                      <a:prstDash val="solid"/>
+                      <a:round/>
+                      <a:headEnd type="none" w="med" len="med"/>
+                      <a:tailEnd type="none" w="med" len="med"/>
+                    </a:lnR>
+                    <a:lnT w="12700" cap="flat" cmpd="sng" algn="ctr">
+                      <a:solidFill>
+                        <a:schemeClr val="tx1"/>
+                      </a:solidFill>
+                      <a:prstDash val="solid"/>
+                      <a:round/>
+                      <a:headEnd type="none" w="med" len="med"/>
+                      <a:tailEnd type="none" w="med" len="med"/>
+                    </a:lnT>
+                    <a:lnB w="12700" cap="flat" cmpd="sng" algn="ctr">
+                      <a:solidFill>
+                        <a:schemeClr val="tx1"/>
+                      </a:solidFill>
+                      <a:prstDash val="solid"/>
+                      <a:round/>
+                      <a:headEnd type="none" w="med" len="med"/>
+                      <a:tailEnd type="none" w="med" len="med"/>
+                    </a:lnB>
+                    <a:noFill/>
+                  </a:tcPr>
+                </a:tc>
+                <a:extLst>
+                  <a:ext uri="{0D108BD9-81ED-4DB2-BD59-A6C34878D82A}">
+                    <a16:rowId xmlns:a16="http://schemas.microsoft.com/office/drawing/2014/main" val="2971610738"/>
+                  </a:ext>
+                </a:extLst>
+              </a:tr>
+              <a:tr h="165512">
+                <a:tc>
+                  <a:txBody>
+                    <a:bodyPr/>
+                    <a:lstStyle/>
+                    <a:p>
+                      <a:pPr marL="57150" marR="0">
+                        <a:spcBef>
+                          <a:spcPts val="505"/>
+                        </a:spcBef>
+                        <a:spcAft>
+                          <a:spcPts val="0"/>
+                        </a:spcAft>
+                      </a:pPr>
+                      <a:r>
+                        <a:rPr lang="es-MX" sz="500" b="0" dirty="0">
+                          <a:solidFill>
+                            <a:schemeClr val="tx1"/>
+                          </a:solidFill>
+                          <a:effectLst/>
+                          <a:latin typeface="Calibri" panose="020F0502020204030204" pitchFamily="34" charset="0"/>
+                          <a:ea typeface="Calibri" panose="020F0502020204030204" pitchFamily="34" charset="0"/>
+                          <a:cs typeface="Times New Roman" panose="02020603050405020304" pitchFamily="18" charset="0"/>
+                        </a:rPr>
+                        <a:t>GLM (Demanda de GN como función de población &amp; PIB)</a:t>
+                      </a:r>
+                    </a:p>
+                  </a:txBody>
+                  <a:tcPr marL="0" marR="0" marT="0" marB="0" anchor="ctr">
+                    <a:lnL w="12700" cap="flat" cmpd="sng" algn="ctr">
+                      <a:solidFill>
+                        <a:schemeClr val="tx1"/>
+                      </a:solidFill>
+                      <a:prstDash val="solid"/>
+                      <a:round/>
+                      <a:headEnd type="none" w="med" len="med"/>
+                      <a:tailEnd type="none" w="med" len="med"/>
+                    </a:lnL>
+                    <a:lnR w="12700" cap="flat" cmpd="sng" algn="ctr">
+                      <a:solidFill>
+                        <a:schemeClr val="tx1"/>
+                      </a:solidFill>
+                      <a:prstDash val="solid"/>
+                      <a:round/>
+                      <a:headEnd type="none" w="med" len="med"/>
+                      <a:tailEnd type="none" w="med" len="med"/>
+                    </a:lnR>
+                    <a:lnT w="12700" cap="flat" cmpd="sng" algn="ctr">
+                      <a:solidFill>
+                        <a:schemeClr val="tx1"/>
+                      </a:solidFill>
+                      <a:prstDash val="solid"/>
+                      <a:round/>
+                      <a:headEnd type="none" w="med" len="med"/>
+                      <a:tailEnd type="none" w="med" len="med"/>
+                    </a:lnT>
+                    <a:lnB w="12700" cap="flat" cmpd="sng" algn="ctr">
+                      <a:solidFill>
+                        <a:schemeClr val="tx1"/>
+                      </a:solidFill>
+                      <a:prstDash val="solid"/>
+                      <a:round/>
+                      <a:headEnd type="none" w="med" len="med"/>
+                      <a:tailEnd type="none" w="med" len="med"/>
+                    </a:lnB>
+                    <a:noFill/>
+                  </a:tcPr>
+                </a:tc>
+                <a:tc>
+                  <a:txBody>
+                    <a:bodyPr/>
+                    <a:lstStyle/>
+                    <a:p>
+                      <a:pPr marL="60325" marR="0">
+                        <a:spcBef>
+                          <a:spcPts val="505"/>
+                        </a:spcBef>
+                        <a:spcAft>
+                          <a:spcPts val="0"/>
+                        </a:spcAft>
+                      </a:pPr>
+                      <a:r>
+                        <a:rPr lang="es-ES" sz="500" b="0" dirty="0">
+                          <a:solidFill>
+                            <a:schemeClr val="tx1"/>
+                          </a:solidFill>
+                          <a:effectLst/>
+                        </a:rPr>
+                        <a:t>14.5%</a:t>
+                      </a:r>
+                      <a:endParaRPr lang="es-MX" sz="500" b="0" dirty="0">
+                        <a:solidFill>
+                          <a:schemeClr val="tx1"/>
+                        </a:solidFill>
+                        <a:effectLst/>
+                        <a:latin typeface="Calibri" panose="020F0502020204030204" pitchFamily="34" charset="0"/>
+                        <a:ea typeface="Calibri" panose="020F0502020204030204" pitchFamily="34" charset="0"/>
+                        <a:cs typeface="Times New Roman" panose="02020603050405020304" pitchFamily="18" charset="0"/>
+                      </a:endParaRPr>
+                    </a:p>
+                  </a:txBody>
+                  <a:tcPr marL="0" marR="0" marT="0" marB="0" anchor="ctr">
+                    <a:lnL w="12700" cap="flat" cmpd="sng" algn="ctr">
+                      <a:solidFill>
+                        <a:schemeClr val="tx1"/>
+                      </a:solidFill>
+                      <a:prstDash val="solid"/>
+                      <a:round/>
+                      <a:headEnd type="none" w="med" len="med"/>
+                      <a:tailEnd type="none" w="med" len="med"/>
+                    </a:lnL>
+                    <a:lnR w="12700" cap="flat" cmpd="sng" algn="ctr">
+                      <a:solidFill>
+                        <a:schemeClr val="tx1"/>
+                      </a:solidFill>
+                      <a:prstDash val="solid"/>
+                      <a:round/>
+                      <a:headEnd type="none" w="med" len="med"/>
+                      <a:tailEnd type="none" w="med" len="med"/>
+                    </a:lnR>
+                    <a:lnT w="12700" cap="flat" cmpd="sng" algn="ctr">
+                      <a:solidFill>
+                        <a:schemeClr val="tx1"/>
+                      </a:solidFill>
+                      <a:prstDash val="solid"/>
+                      <a:round/>
+                      <a:headEnd type="none" w="med" len="med"/>
+                      <a:tailEnd type="none" w="med" len="med"/>
+                    </a:lnT>
+                    <a:lnB w="12700" cap="flat" cmpd="sng" algn="ctr">
+                      <a:solidFill>
+                        <a:schemeClr val="tx1"/>
+                      </a:solidFill>
+                      <a:prstDash val="solid"/>
+                      <a:round/>
+                      <a:headEnd type="none" w="med" len="med"/>
+                      <a:tailEnd type="none" w="med" len="med"/>
+                    </a:lnB>
+                    <a:noFill/>
+                  </a:tcPr>
+                </a:tc>
+                <a:tc rowSpan="2">
+                  <a:txBody>
+                    <a:bodyPr/>
+                    <a:lstStyle/>
+                    <a:p>
+                      <a:pPr marL="63500" marR="86360">
+                        <a:spcBef>
+                          <a:spcPts val="505"/>
+                        </a:spcBef>
+                        <a:spcAft>
+                          <a:spcPts val="0"/>
+                        </a:spcAft>
+                      </a:pPr>
+                      <a:r>
+                        <a:rPr lang="es-MX" sz="500" b="0" dirty="0">
+                          <a:solidFill>
+                            <a:schemeClr val="tx1"/>
+                          </a:solidFill>
+                          <a:effectLst/>
+                          <a:latin typeface="Calibri" panose="020F0502020204030204" pitchFamily="34" charset="0"/>
+                          <a:ea typeface="Calibri" panose="020F0502020204030204" pitchFamily="34" charset="0"/>
+                          <a:cs typeface="Times New Roman" panose="02020603050405020304" pitchFamily="18" charset="0"/>
+                        </a:rPr>
+                        <a:t>Se usó la función Gaussian (</a:t>
+                      </a:r>
+                      <a:r>
+                        <a:rPr lang="es-MX" sz="500" b="0" dirty="0" err="1">
+                          <a:solidFill>
+                            <a:schemeClr val="tx1"/>
+                          </a:solidFill>
+                          <a:effectLst/>
+                          <a:latin typeface="Calibri" panose="020F0502020204030204" pitchFamily="34" charset="0"/>
+                          <a:ea typeface="Calibri" panose="020F0502020204030204" pitchFamily="34" charset="0"/>
+                          <a:cs typeface="Times New Roman" panose="02020603050405020304" pitchFamily="18" charset="0"/>
+                        </a:rPr>
+                        <a:t>identity</a:t>
+                      </a:r>
+                      <a:r>
+                        <a:rPr lang="es-MX" sz="500" b="0" dirty="0">
+                          <a:solidFill>
+                            <a:schemeClr val="tx1"/>
+                          </a:solidFill>
+                          <a:effectLst/>
+                          <a:latin typeface="Calibri" panose="020F0502020204030204" pitchFamily="34" charset="0"/>
+                          <a:ea typeface="Calibri" panose="020F0502020204030204" pitchFamily="34" charset="0"/>
+                          <a:cs typeface="Times New Roman" panose="02020603050405020304" pitchFamily="18" charset="0"/>
+                        </a:rPr>
+                        <a:t>) para GLM “simple”</a:t>
+                      </a:r>
+                    </a:p>
+                  </a:txBody>
+                  <a:tcPr marL="0" marR="0" marT="0" marB="0" anchor="ctr">
+                    <a:lnL w="12700" cap="flat" cmpd="sng" algn="ctr">
+                      <a:solidFill>
+                        <a:schemeClr val="tx1"/>
+                      </a:solidFill>
+                      <a:prstDash val="solid"/>
+                      <a:round/>
+                      <a:headEnd type="none" w="med" len="med"/>
+                      <a:tailEnd type="none" w="med" len="med"/>
+                    </a:lnL>
+                    <a:lnR w="12700" cap="flat" cmpd="sng" algn="ctr">
+                      <a:solidFill>
+                        <a:schemeClr val="tx1"/>
+                      </a:solidFill>
+                      <a:prstDash val="solid"/>
+                      <a:round/>
+                      <a:headEnd type="none" w="med" len="med"/>
+                      <a:tailEnd type="none" w="med" len="med"/>
+                    </a:lnR>
+                    <a:lnT w="12700" cap="flat" cmpd="sng" algn="ctr">
+                      <a:solidFill>
+                        <a:schemeClr val="tx1"/>
+                      </a:solidFill>
+                      <a:prstDash val="solid"/>
+                      <a:round/>
+                      <a:headEnd type="none" w="med" len="med"/>
+                      <a:tailEnd type="none" w="med" len="med"/>
+                    </a:lnT>
+                    <a:lnB w="12700" cap="flat" cmpd="sng" algn="ctr">
+                      <a:solidFill>
+                        <a:schemeClr val="tx1"/>
+                      </a:solidFill>
+                      <a:prstDash val="solid"/>
+                      <a:round/>
+                      <a:headEnd type="none" w="med" len="med"/>
+                      <a:tailEnd type="none" w="med" len="med"/>
+                    </a:lnB>
+                    <a:noFill/>
+                  </a:tcPr>
+                </a:tc>
+                <a:extLst>
+                  <a:ext uri="{0D108BD9-81ED-4DB2-BD59-A6C34878D82A}">
+                    <a16:rowId xmlns:a16="http://schemas.microsoft.com/office/drawing/2014/main" val="186239642"/>
+                  </a:ext>
+                </a:extLst>
+              </a:tr>
+              <a:tr h="165512">
+                <a:tc>
+                  <a:txBody>
+                    <a:bodyPr/>
+                    <a:lstStyle/>
+                    <a:p>
+                      <a:pPr marL="57150" marR="0">
+                        <a:spcBef>
+                          <a:spcPts val="515"/>
+                        </a:spcBef>
+                        <a:spcAft>
+                          <a:spcPts val="0"/>
+                        </a:spcAft>
+                      </a:pPr>
+                      <a:r>
+                        <a:rPr lang="es-MX" sz="500" b="0" dirty="0">
+                          <a:solidFill>
+                            <a:schemeClr val="tx1"/>
+                          </a:solidFill>
+                          <a:effectLst/>
+                          <a:latin typeface="Calibri" panose="020F0502020204030204" pitchFamily="34" charset="0"/>
+                          <a:ea typeface="Calibri" panose="020F0502020204030204" pitchFamily="34" charset="0"/>
+                          <a:cs typeface="Times New Roman" panose="02020603050405020304" pitchFamily="18" charset="0"/>
+                        </a:rPr>
+                        <a:t>GLM (Demanda de GN como función de población)</a:t>
+                      </a:r>
+                    </a:p>
+                  </a:txBody>
+                  <a:tcPr marL="0" marR="0" marT="0" marB="0" anchor="ctr">
+                    <a:lnL w="12700" cap="flat" cmpd="sng" algn="ctr">
+                      <a:solidFill>
+                        <a:schemeClr val="tx1"/>
+                      </a:solidFill>
+                      <a:prstDash val="solid"/>
+                      <a:round/>
+                      <a:headEnd type="none" w="med" len="med"/>
+                      <a:tailEnd type="none" w="med" len="med"/>
+                    </a:lnL>
+                    <a:lnR w="12700" cap="flat" cmpd="sng" algn="ctr">
+                      <a:solidFill>
+                        <a:schemeClr val="tx1"/>
+                      </a:solidFill>
+                      <a:prstDash val="solid"/>
+                      <a:round/>
+                      <a:headEnd type="none" w="med" len="med"/>
+                      <a:tailEnd type="none" w="med" len="med"/>
+                    </a:lnR>
+                    <a:lnT w="12700" cap="flat" cmpd="sng" algn="ctr">
+                      <a:solidFill>
+                        <a:schemeClr val="tx1"/>
+                      </a:solidFill>
+                      <a:prstDash val="solid"/>
+                      <a:round/>
+                      <a:headEnd type="none" w="med" len="med"/>
+                      <a:tailEnd type="none" w="med" len="med"/>
+                    </a:lnT>
+                    <a:lnB w="12700" cap="flat" cmpd="sng" algn="ctr">
+                      <a:solidFill>
+                        <a:schemeClr val="tx1"/>
+                      </a:solidFill>
+                      <a:prstDash val="solid"/>
+                      <a:round/>
+                      <a:headEnd type="none" w="med" len="med"/>
+                      <a:tailEnd type="none" w="med" len="med"/>
+                    </a:lnB>
+                    <a:noFill/>
+                  </a:tcPr>
+                </a:tc>
+                <a:tc>
+                  <a:txBody>
+                    <a:bodyPr/>
+                    <a:lstStyle/>
+                    <a:p>
+                      <a:pPr marL="60325" marR="89535">
+                        <a:spcBef>
+                          <a:spcPts val="515"/>
+                        </a:spcBef>
+                        <a:spcAft>
+                          <a:spcPts val="0"/>
+                        </a:spcAft>
+                      </a:pPr>
+                      <a:r>
+                        <a:rPr lang="es-ES" sz="500" b="0" dirty="0">
+                          <a:solidFill>
+                            <a:schemeClr val="tx1"/>
+                          </a:solidFill>
+                          <a:effectLst/>
+                        </a:rPr>
+                        <a:t>13%</a:t>
+                      </a:r>
+                      <a:endParaRPr lang="es-MX" sz="500" b="0" dirty="0">
+                        <a:solidFill>
+                          <a:schemeClr val="tx1"/>
+                        </a:solidFill>
+                        <a:effectLst/>
+                        <a:latin typeface="Calibri" panose="020F0502020204030204" pitchFamily="34" charset="0"/>
+                        <a:ea typeface="Calibri" panose="020F0502020204030204" pitchFamily="34" charset="0"/>
+                        <a:cs typeface="Times New Roman" panose="02020603050405020304" pitchFamily="18" charset="0"/>
+                      </a:endParaRPr>
+                    </a:p>
+                  </a:txBody>
+                  <a:tcPr marL="0" marR="0" marT="0" marB="0" anchor="ctr">
+                    <a:lnL w="12700" cap="flat" cmpd="sng" algn="ctr">
+                      <a:solidFill>
+                        <a:schemeClr val="tx1"/>
+                      </a:solidFill>
+                      <a:prstDash val="solid"/>
+                      <a:round/>
+                      <a:headEnd type="none" w="med" len="med"/>
+                      <a:tailEnd type="none" w="med" len="med"/>
+                    </a:lnL>
+                    <a:lnR w="12700" cap="flat" cmpd="sng" algn="ctr">
+                      <a:solidFill>
+                        <a:schemeClr val="tx1"/>
+                      </a:solidFill>
+                      <a:prstDash val="solid"/>
+                      <a:round/>
+                      <a:headEnd type="none" w="med" len="med"/>
+                      <a:tailEnd type="none" w="med" len="med"/>
+                    </a:lnR>
+                    <a:lnT w="12700" cap="flat" cmpd="sng" algn="ctr">
+                      <a:solidFill>
+                        <a:schemeClr val="tx1"/>
+                      </a:solidFill>
+                      <a:prstDash val="solid"/>
+                      <a:round/>
+                      <a:headEnd type="none" w="med" len="med"/>
+                      <a:tailEnd type="none" w="med" len="med"/>
+                    </a:lnT>
+                    <a:lnB w="12700" cap="flat" cmpd="sng" algn="ctr">
+                      <a:solidFill>
+                        <a:schemeClr val="tx1"/>
+                      </a:solidFill>
+                      <a:prstDash val="solid"/>
+                      <a:round/>
+                      <a:headEnd type="none" w="med" len="med"/>
+                      <a:tailEnd type="none" w="med" len="med"/>
+                    </a:lnB>
+                    <a:noFill/>
+                  </a:tcPr>
+                </a:tc>
+                <a:tc vMerge="1">
+                  <a:txBody>
+                    <a:bodyPr/>
+                    <a:lstStyle/>
+                    <a:p>
+                      <a:pPr marL="63500" marR="0">
+                        <a:spcBef>
+                          <a:spcPts val="515"/>
+                        </a:spcBef>
+                        <a:spcAft>
+                          <a:spcPts val="0"/>
+                        </a:spcAft>
+                      </a:pPr>
+                      <a:endParaRPr lang="es-MX" sz="500" b="0" dirty="0">
+                        <a:solidFill>
+                          <a:schemeClr val="tx1"/>
+                        </a:solidFill>
+                        <a:effectLst/>
+                        <a:latin typeface="Calibri" panose="020F0502020204030204" pitchFamily="34" charset="0"/>
+                        <a:ea typeface="Calibri" panose="020F0502020204030204" pitchFamily="34" charset="0"/>
+                        <a:cs typeface="Times New Roman" panose="02020603050405020304" pitchFamily="18" charset="0"/>
+                      </a:endParaRPr>
+                    </a:p>
+                  </a:txBody>
+                  <a:tcPr marL="0" marR="0" marT="0" marB="0" anchor="ctr">
+                    <a:lnL w="12700" cap="flat" cmpd="sng" algn="ctr">
+                      <a:solidFill>
+                        <a:schemeClr val="tx1"/>
+                      </a:solidFill>
+                      <a:prstDash val="solid"/>
+                      <a:round/>
+                      <a:headEnd type="none" w="med" len="med"/>
+                      <a:tailEnd type="none" w="med" len="med"/>
+                    </a:lnL>
+                    <a:lnR w="12700" cap="flat" cmpd="sng" algn="ctr">
+                      <a:solidFill>
+                        <a:schemeClr val="tx1"/>
+                      </a:solidFill>
+                      <a:prstDash val="solid"/>
+                      <a:round/>
+                      <a:headEnd type="none" w="med" len="med"/>
+                      <a:tailEnd type="none" w="med" len="med"/>
+                    </a:lnR>
+                    <a:lnT w="12700" cap="flat" cmpd="sng" algn="ctr">
+                      <a:solidFill>
+                        <a:schemeClr val="tx1"/>
+                      </a:solidFill>
+                      <a:prstDash val="solid"/>
+                      <a:round/>
+                      <a:headEnd type="none" w="med" len="med"/>
+                      <a:tailEnd type="none" w="med" len="med"/>
+                    </a:lnT>
+                    <a:lnB w="12700" cap="flat" cmpd="sng" algn="ctr">
+                      <a:solidFill>
+                        <a:schemeClr val="tx1"/>
+                      </a:solidFill>
+                      <a:prstDash val="solid"/>
+                      <a:round/>
+                      <a:headEnd type="none" w="med" len="med"/>
+                      <a:tailEnd type="none" w="med" len="med"/>
+                    </a:lnB>
+                    <a:noFill/>
+                  </a:tcPr>
+                </a:tc>
+                <a:extLst>
+                  <a:ext uri="{0D108BD9-81ED-4DB2-BD59-A6C34878D82A}">
+                    <a16:rowId xmlns:a16="http://schemas.microsoft.com/office/drawing/2014/main" val="2474187109"/>
+                  </a:ext>
+                </a:extLst>
+              </a:tr>
+            </a:tbl>
+          </a:graphicData>
+        </a:graphic>
+      </p:graphicFrame>
+      <p:sp>
+        <p:nvSpPr>
+          <p:cNvPr id="10" name="Google Shape;89;p1">
+            <a:extLst>
+              <a:ext uri="{FF2B5EF4-FFF2-40B4-BE49-F238E27FC236}">
+                <a16:creationId xmlns:a16="http://schemas.microsoft.com/office/drawing/2014/main" id="{E31D09DC-CA6D-F7B6-4422-53B4E9DC1709}"/>
+              </a:ext>
+            </a:extLst>
+          </p:cNvPr>
+          <p:cNvSpPr txBox="1"/>
+          <p:nvPr/>
+        </p:nvSpPr>
+        <p:spPr>
+          <a:xfrm>
+            <a:off x="423178" y="11448761"/>
+            <a:ext cx="4357658" cy="1017589"/>
+          </a:xfrm>
+          <a:prstGeom prst="rect">
+            <a:avLst/>
+          </a:prstGeom>
+          <a:noFill/>
+          <a:ln>
+            <a:noFill/>
+          </a:ln>
+        </p:spPr>
+        <p:txBody>
+          <a:bodyPr spcFirstLastPara="1" wrap="square" lIns="52225" tIns="26100" rIns="52225" bIns="26100" anchor="t" anchorCtr="0">
+            <a:spAutoFit/>
+          </a:bodyPr>
+          <a:lstStyle/>
+          <a:p>
+            <a:pPr marL="0" marR="0" lvl="0" indent="0" algn="just" rtl="0">
+              <a:lnSpc>
+                <a:spcPct val="95000"/>
+              </a:lnSpc>
+              <a:spcBef>
+                <a:spcPts val="0"/>
+              </a:spcBef>
+              <a:spcAft>
+                <a:spcPts val="0"/>
+              </a:spcAft>
+              <a:buClr>
+                <a:schemeClr val="dk1"/>
+              </a:buClr>
+              <a:buSzPts val="1200"/>
+              <a:buFont typeface="Times New Roman"/>
+              <a:buNone/>
+            </a:pPr>
+            <a:r>
+              <a:rPr lang="es-MX" sz="1100" dirty="0">
+                <a:solidFill>
+                  <a:schemeClr val="tx1"/>
+                </a:solidFill>
+                <a:latin typeface="+mn-lt"/>
+                <a:ea typeface="Encode Sans ExtraLight"/>
+                <a:cs typeface="Encode Sans ExtraLight"/>
+                <a:sym typeface="Encode Sans ExtraLight"/>
+              </a:rPr>
+              <a:t>Se han llevado a cabo transformaciones de la variable dependiente y/o Suavizamiento de los datos históricos de la serie de tiempo de demanda de gas natural con el objetivo de lograr mejores valores de predicción y evitar que los valores atípicos de los años 2020 y 2021 afecten de manera tan significativa a los modelos resultantes </a:t>
+            </a:r>
+          </a:p>
+          <a:p>
+            <a:pPr marL="0" marR="0" lvl="0" indent="0" algn="just" rtl="0">
+              <a:lnSpc>
+                <a:spcPct val="95000"/>
+              </a:lnSpc>
+              <a:spcBef>
+                <a:spcPts val="0"/>
+              </a:spcBef>
+              <a:spcAft>
+                <a:spcPts val="0"/>
+              </a:spcAft>
+              <a:buClr>
+                <a:schemeClr val="dk1"/>
+              </a:buClr>
+              <a:buSzPts val="1200"/>
+              <a:buFont typeface="Times New Roman"/>
+              <a:buNone/>
+            </a:pPr>
+            <a:endParaRPr lang="es-MX" sz="1100" dirty="0">
+              <a:solidFill>
+                <a:schemeClr val="tx1"/>
+              </a:solidFill>
+              <a:latin typeface="+mn-lt"/>
+              <a:ea typeface="Encode Sans ExtraLight"/>
+              <a:cs typeface="Encode Sans ExtraLight"/>
+              <a:sym typeface="Encode Sans ExtraLight"/>
+            </a:endParaRPr>
+          </a:p>
+        </p:txBody>
+      </p:sp>
+      <p:pic>
+        <p:nvPicPr>
+          <p:cNvPr id="23" name="Picture 22">
+            <a:extLst>
+              <a:ext uri="{FF2B5EF4-FFF2-40B4-BE49-F238E27FC236}">
+                <a16:creationId xmlns:a16="http://schemas.microsoft.com/office/drawing/2014/main" id="{D6FE2684-77EE-2067-B077-11BFBAC9055A}"/>
+              </a:ext>
+            </a:extLst>
+          </p:cNvPr>
+          <p:cNvPicPr>
+            <a:picLocks noChangeAspect="1"/>
+          </p:cNvPicPr>
+          <p:nvPr/>
+        </p:nvPicPr>
+        <p:blipFill>
+          <a:blip r:embed="rId9"/>
+          <a:stretch>
+            <a:fillRect/>
+          </a:stretch>
+        </p:blipFill>
+        <p:spPr>
+          <a:xfrm>
+            <a:off x="984048" y="8007536"/>
+            <a:ext cx="1362738" cy="841004"/>
+          </a:xfrm>
+          <a:prstGeom prst="rect">
+            <a:avLst/>
+          </a:prstGeom>
+        </p:spPr>
+      </p:pic>
+      <p:sp>
+        <p:nvSpPr>
+          <p:cNvPr id="24" name="Google Shape;89;p1">
+            <a:extLst>
+              <a:ext uri="{FF2B5EF4-FFF2-40B4-BE49-F238E27FC236}">
+                <a16:creationId xmlns:a16="http://schemas.microsoft.com/office/drawing/2014/main" id="{7CBE814C-C2C1-C771-09A0-9ED1B84C585A}"/>
+              </a:ext>
+            </a:extLst>
+          </p:cNvPr>
+          <p:cNvSpPr txBox="1"/>
+          <p:nvPr/>
+        </p:nvSpPr>
+        <p:spPr>
+          <a:xfrm>
+            <a:off x="400975" y="7652662"/>
+            <a:ext cx="4481669" cy="549769"/>
+          </a:xfrm>
+          <a:prstGeom prst="rect">
+            <a:avLst/>
+          </a:prstGeom>
+          <a:noFill/>
+          <a:ln>
+            <a:noFill/>
+          </a:ln>
+        </p:spPr>
+        <p:txBody>
+          <a:bodyPr spcFirstLastPara="1" wrap="square" lIns="52225" tIns="26100" rIns="52225" bIns="26100" anchor="t" anchorCtr="0">
+            <a:spAutoFit/>
+          </a:bodyPr>
+          <a:lstStyle/>
+          <a:p>
+            <a:pPr marL="0" marR="0" lvl="0" indent="0" algn="just" rtl="0">
+              <a:lnSpc>
+                <a:spcPct val="95000"/>
+              </a:lnSpc>
+              <a:spcBef>
+                <a:spcPts val="0"/>
+              </a:spcBef>
+              <a:spcAft>
+                <a:spcPts val="0"/>
+              </a:spcAft>
+              <a:buClr>
+                <a:schemeClr val="dk1"/>
+              </a:buClr>
+              <a:buSzPts val="1200"/>
+              <a:buFont typeface="Times New Roman"/>
+              <a:buNone/>
+            </a:pPr>
+            <a:r>
+              <a:rPr lang="es-MX" sz="1100" dirty="0">
+                <a:solidFill>
+                  <a:schemeClr val="tx1"/>
+                </a:solidFill>
+                <a:latin typeface="+mn-lt"/>
+                <a:ea typeface="Encode Sans ExtraLight"/>
+                <a:cs typeface="Encode Sans ExtraLight"/>
+                <a:sym typeface="Encode Sans ExtraLight"/>
+              </a:rPr>
+              <a:t>Se muestra la serie histórica de la demanda de gas natural en el sector eléctrico en México </a:t>
+            </a:r>
+          </a:p>
+          <a:p>
+            <a:pPr marL="0" marR="0" lvl="0" indent="0" algn="just" rtl="0">
+              <a:lnSpc>
+                <a:spcPct val="95000"/>
+              </a:lnSpc>
+              <a:spcBef>
+                <a:spcPts val="0"/>
+              </a:spcBef>
+              <a:spcAft>
+                <a:spcPts val="0"/>
+              </a:spcAft>
+              <a:buClr>
+                <a:schemeClr val="dk1"/>
+              </a:buClr>
+              <a:buSzPts val="1200"/>
+              <a:buFont typeface="Times New Roman"/>
+              <a:buNone/>
+            </a:pPr>
+            <a:endParaRPr sz="1200" dirty="0">
+              <a:solidFill>
+                <a:schemeClr val="dk1"/>
+              </a:solidFill>
+              <a:latin typeface="Encode Sans Thin"/>
+              <a:ea typeface="Encode Sans Thin"/>
+              <a:cs typeface="Encode Sans Thin"/>
+              <a:sym typeface="Encode Sans Thin"/>
+            </a:endParaRPr>
+          </a:p>
+        </p:txBody>
+      </p:sp>
+      <p:pic>
+        <p:nvPicPr>
+          <p:cNvPr id="26" name="Picture 25">
+            <a:extLst>
+              <a:ext uri="{FF2B5EF4-FFF2-40B4-BE49-F238E27FC236}">
+                <a16:creationId xmlns:a16="http://schemas.microsoft.com/office/drawing/2014/main" id="{92682CCC-7BDD-9EC6-A2C5-280F5D47A56E}"/>
+              </a:ext>
+            </a:extLst>
+          </p:cNvPr>
+          <p:cNvPicPr>
+            <a:picLocks noChangeAspect="1"/>
+          </p:cNvPicPr>
+          <p:nvPr/>
+        </p:nvPicPr>
+        <p:blipFill>
+          <a:blip r:embed="rId10"/>
+          <a:stretch>
+            <a:fillRect/>
+          </a:stretch>
+        </p:blipFill>
+        <p:spPr>
+          <a:xfrm>
+            <a:off x="2822730" y="7980735"/>
+            <a:ext cx="1436753" cy="886682"/>
+          </a:xfrm>
+          <a:prstGeom prst="rect">
+            <a:avLst/>
+          </a:prstGeom>
+        </p:spPr>
+      </p:pic>
+      <p:graphicFrame>
+        <p:nvGraphicFramePr>
+          <p:cNvPr id="27" name="Table 26">
+            <a:extLst>
+              <a:ext uri="{FF2B5EF4-FFF2-40B4-BE49-F238E27FC236}">
+                <a16:creationId xmlns:a16="http://schemas.microsoft.com/office/drawing/2014/main" id="{D68613D7-43F0-5A0A-549B-53678FA049F6}"/>
+              </a:ext>
+            </a:extLst>
+          </p:cNvPr>
+          <p:cNvGraphicFramePr>
+            <a:graphicFrameLocks noGrp="1"/>
+          </p:cNvGraphicFramePr>
+          <p:nvPr>
+            <p:extLst>
+              <p:ext uri="{D42A27DB-BD31-4B8C-83A1-F6EECF244321}">
+                <p14:modId xmlns:p14="http://schemas.microsoft.com/office/powerpoint/2010/main" val="2044346106"/>
+              </p:ext>
+            </p:extLst>
+          </p:nvPr>
+        </p:nvGraphicFramePr>
+        <p:xfrm>
+          <a:off x="693339" y="13623196"/>
+          <a:ext cx="3727563" cy="407224"/>
+        </p:xfrm>
+        <a:graphic>
+          <a:graphicData uri="http://schemas.openxmlformats.org/drawingml/2006/table">
+            <a:tbl>
+              <a:tblPr firstRow="1" firstCol="1" lastRow="1" lastCol="1" bandRow="1" bandCol="1">
+                <a:tableStyleId>{073A0DAA-6AF3-43AB-8588-CEC1D06C72B9}</a:tableStyleId>
+              </a:tblPr>
+              <a:tblGrid>
+                <a:gridCol w="1775540">
+                  <a:extLst>
+                    <a:ext uri="{9D8B030D-6E8A-4147-A177-3AD203B41FA5}">
+                      <a16:colId xmlns:a16="http://schemas.microsoft.com/office/drawing/2014/main" val="3883179358"/>
+                    </a:ext>
+                  </a:extLst>
+                </a:gridCol>
+                <a:gridCol w="617220">
+                  <a:extLst>
+                    <a:ext uri="{9D8B030D-6E8A-4147-A177-3AD203B41FA5}">
+                      <a16:colId xmlns:a16="http://schemas.microsoft.com/office/drawing/2014/main" val="3238939105"/>
+                    </a:ext>
+                  </a:extLst>
+                </a:gridCol>
+                <a:gridCol w="1334803">
+                  <a:extLst>
+                    <a:ext uri="{9D8B030D-6E8A-4147-A177-3AD203B41FA5}">
+                      <a16:colId xmlns:a16="http://schemas.microsoft.com/office/drawing/2014/main" val="3179396712"/>
+                    </a:ext>
+                  </a:extLst>
+                </a:gridCol>
+              </a:tblGrid>
+              <a:tr h="67256">
+                <a:tc>
+                  <a:txBody>
+                    <a:bodyPr/>
+                    <a:lstStyle/>
+                    <a:p>
+                      <a:pPr marL="0" marR="0">
+                        <a:spcBef>
+                          <a:spcPts val="0"/>
+                        </a:spcBef>
+                        <a:spcAft>
+                          <a:spcPts val="0"/>
+                        </a:spcAft>
+                      </a:pPr>
+                      <a:r>
+                        <a:rPr lang="es-ES" sz="500" dirty="0">
+                          <a:solidFill>
+                            <a:schemeClr val="tx1"/>
+                          </a:solidFill>
+                          <a:effectLst/>
+                        </a:rPr>
+                        <a:t> Modelo</a:t>
+                      </a:r>
+                      <a:endParaRPr lang="es-MX" sz="500" dirty="0">
+                        <a:solidFill>
+                          <a:schemeClr val="tx1"/>
+                        </a:solidFill>
+                        <a:effectLst/>
+                        <a:latin typeface="Calibri" panose="020F0502020204030204" pitchFamily="34" charset="0"/>
+                        <a:ea typeface="Calibri" panose="020F0502020204030204" pitchFamily="34" charset="0"/>
+                        <a:cs typeface="Times New Roman" panose="02020603050405020304" pitchFamily="18" charset="0"/>
+                      </a:endParaRPr>
+                    </a:p>
+                  </a:txBody>
+                  <a:tcPr marL="0" marR="0" marT="0" marB="0">
+                    <a:lnL w="12700" cap="flat" cmpd="sng" algn="ctr">
+                      <a:solidFill>
+                        <a:schemeClr val="tx1"/>
+                      </a:solidFill>
+                      <a:prstDash val="solid"/>
+                      <a:round/>
+                      <a:headEnd type="none" w="med" len="med"/>
+                      <a:tailEnd type="none" w="med" len="med"/>
+                    </a:lnL>
+                    <a:lnR w="12700" cap="flat" cmpd="sng" algn="ctr">
+                      <a:solidFill>
+                        <a:schemeClr val="tx1"/>
+                      </a:solidFill>
+                      <a:prstDash val="solid"/>
+                      <a:round/>
+                      <a:headEnd type="none" w="med" len="med"/>
+                      <a:tailEnd type="none" w="med" len="med"/>
+                    </a:lnR>
+                    <a:lnT w="12700" cap="flat" cmpd="sng" algn="ctr">
+                      <a:solidFill>
+                        <a:schemeClr val="tx1"/>
+                      </a:solidFill>
+                      <a:prstDash val="solid"/>
+                      <a:round/>
+                      <a:headEnd type="none" w="med" len="med"/>
+                      <a:tailEnd type="none" w="med" len="med"/>
+                    </a:lnT>
+                    <a:lnB w="12700" cap="flat" cmpd="sng" algn="ctr">
+                      <a:solidFill>
+                        <a:schemeClr val="tx1"/>
+                      </a:solidFill>
+                      <a:prstDash val="solid"/>
+                      <a:round/>
+                      <a:headEnd type="none" w="med" len="med"/>
+                      <a:tailEnd type="none" w="med" len="med"/>
+                    </a:lnB>
+                    <a:noFill/>
+                  </a:tcPr>
+                </a:tc>
+                <a:tc>
+                  <a:txBody>
+                    <a:bodyPr/>
+                    <a:lstStyle/>
+                    <a:p>
+                      <a:pPr marL="60325" marR="0">
+                        <a:spcBef>
+                          <a:spcPts val="560"/>
+                        </a:spcBef>
+                        <a:spcAft>
+                          <a:spcPts val="0"/>
+                        </a:spcAft>
+                      </a:pPr>
+                      <a:r>
+                        <a:rPr lang="es-ES" sz="500" dirty="0">
+                          <a:solidFill>
+                            <a:schemeClr val="tx1"/>
+                          </a:solidFill>
+                          <a:effectLst/>
+                          <a:latin typeface="Calibri" panose="020F0502020204030204" pitchFamily="34" charset="0"/>
+                          <a:ea typeface="Calibri" panose="020F0502020204030204" pitchFamily="34" charset="0"/>
+                          <a:cs typeface="Times New Roman" panose="02020603050405020304" pitchFamily="18" charset="0"/>
+                        </a:rPr>
+                        <a:t>MAPE</a:t>
+                      </a:r>
+                      <a:endParaRPr lang="es-MX" sz="500" dirty="0">
+                        <a:solidFill>
+                          <a:schemeClr val="tx1"/>
+                        </a:solidFill>
+                        <a:effectLst/>
+                        <a:latin typeface="Calibri" panose="020F0502020204030204" pitchFamily="34" charset="0"/>
+                        <a:ea typeface="Calibri" panose="020F0502020204030204" pitchFamily="34" charset="0"/>
+                        <a:cs typeface="Times New Roman" panose="02020603050405020304" pitchFamily="18" charset="0"/>
+                      </a:endParaRPr>
+                    </a:p>
+                  </a:txBody>
+                  <a:tcPr marL="0" marR="0" marT="0" marB="0">
+                    <a:lnL w="12700" cap="flat" cmpd="sng" algn="ctr">
+                      <a:solidFill>
+                        <a:schemeClr val="tx1"/>
+                      </a:solidFill>
+                      <a:prstDash val="solid"/>
+                      <a:round/>
+                      <a:headEnd type="none" w="med" len="med"/>
+                      <a:tailEnd type="none" w="med" len="med"/>
+                    </a:lnL>
+                    <a:lnR w="12700" cap="flat" cmpd="sng" algn="ctr">
+                      <a:solidFill>
+                        <a:schemeClr val="tx1"/>
+                      </a:solidFill>
+                      <a:prstDash val="solid"/>
+                      <a:round/>
+                      <a:headEnd type="none" w="med" len="med"/>
+                      <a:tailEnd type="none" w="med" len="med"/>
+                    </a:lnR>
+                    <a:lnT w="12700" cap="flat" cmpd="sng" algn="ctr">
+                      <a:solidFill>
+                        <a:schemeClr val="tx1"/>
+                      </a:solidFill>
+                      <a:prstDash val="solid"/>
+                      <a:round/>
+                      <a:headEnd type="none" w="med" len="med"/>
+                      <a:tailEnd type="none" w="med" len="med"/>
+                    </a:lnT>
+                    <a:lnB w="12700" cap="flat" cmpd="sng" algn="ctr">
+                      <a:solidFill>
+                        <a:schemeClr val="tx1"/>
+                      </a:solidFill>
+                      <a:prstDash val="solid"/>
+                      <a:round/>
+                      <a:headEnd type="none" w="med" len="med"/>
+                      <a:tailEnd type="none" w="med" len="med"/>
+                    </a:lnB>
+                    <a:noFill/>
+                  </a:tcPr>
+                </a:tc>
+                <a:tc>
+                  <a:txBody>
+                    <a:bodyPr/>
+                    <a:lstStyle/>
+                    <a:p>
+                      <a:pPr marL="63500" marR="0">
+                        <a:spcBef>
+                          <a:spcPts val="560"/>
+                        </a:spcBef>
+                        <a:spcAft>
+                          <a:spcPts val="0"/>
+                        </a:spcAft>
+                      </a:pPr>
+                      <a:r>
+                        <a:rPr lang="es-ES" sz="500" dirty="0">
+                          <a:solidFill>
+                            <a:schemeClr val="tx1"/>
+                          </a:solidFill>
+                          <a:effectLst/>
+                          <a:latin typeface="Calibri" panose="020F0502020204030204" pitchFamily="34" charset="0"/>
+                          <a:ea typeface="Calibri" panose="020F0502020204030204" pitchFamily="34" charset="0"/>
+                          <a:cs typeface="Times New Roman" panose="02020603050405020304" pitchFamily="18" charset="0"/>
+                        </a:rPr>
+                        <a:t>Comentario(s)</a:t>
+                      </a:r>
+                      <a:endParaRPr lang="es-MX" sz="500" dirty="0">
+                        <a:solidFill>
+                          <a:schemeClr val="tx1"/>
+                        </a:solidFill>
+                        <a:effectLst/>
+                        <a:latin typeface="Calibri" panose="020F0502020204030204" pitchFamily="34" charset="0"/>
+                        <a:ea typeface="Calibri" panose="020F0502020204030204" pitchFamily="34" charset="0"/>
+                        <a:cs typeface="Times New Roman" panose="02020603050405020304" pitchFamily="18" charset="0"/>
+                      </a:endParaRPr>
+                    </a:p>
+                  </a:txBody>
+                  <a:tcPr marL="0" marR="0" marT="0" marB="0">
+                    <a:lnL w="12700" cap="flat" cmpd="sng" algn="ctr">
+                      <a:solidFill>
+                        <a:schemeClr val="tx1"/>
+                      </a:solidFill>
+                      <a:prstDash val="solid"/>
+                      <a:round/>
+                      <a:headEnd type="none" w="med" len="med"/>
+                      <a:tailEnd type="none" w="med" len="med"/>
+                    </a:lnL>
+                    <a:lnR w="12700" cap="flat" cmpd="sng" algn="ctr">
+                      <a:solidFill>
+                        <a:schemeClr val="tx1"/>
+                      </a:solidFill>
+                      <a:prstDash val="solid"/>
+                      <a:round/>
+                      <a:headEnd type="none" w="med" len="med"/>
+                      <a:tailEnd type="none" w="med" len="med"/>
+                    </a:lnR>
+                    <a:lnT w="12700" cap="flat" cmpd="sng" algn="ctr">
+                      <a:solidFill>
+                        <a:schemeClr val="tx1"/>
+                      </a:solidFill>
+                      <a:prstDash val="solid"/>
+                      <a:round/>
+                      <a:headEnd type="none" w="med" len="med"/>
+                      <a:tailEnd type="none" w="med" len="med"/>
+                    </a:lnT>
+                    <a:lnB w="12700" cap="flat" cmpd="sng" algn="ctr">
+                      <a:solidFill>
+                        <a:schemeClr val="tx1"/>
+                      </a:solidFill>
+                      <a:prstDash val="solid"/>
+                      <a:round/>
+                      <a:headEnd type="none" w="med" len="med"/>
+                      <a:tailEnd type="none" w="med" len="med"/>
+                    </a:lnB>
+                    <a:noFill/>
+                  </a:tcPr>
+                </a:tc>
+                <a:extLst>
+                  <a:ext uri="{0D108BD9-81ED-4DB2-BD59-A6C34878D82A}">
+                    <a16:rowId xmlns:a16="http://schemas.microsoft.com/office/drawing/2014/main" val="2971610738"/>
+                  </a:ext>
+                </a:extLst>
+              </a:tr>
+              <a:tr h="165512">
+                <a:tc>
+                  <a:txBody>
+                    <a:bodyPr/>
+                    <a:lstStyle/>
+                    <a:p>
+                      <a:pPr marL="57150" marR="0">
+                        <a:spcBef>
+                          <a:spcPts val="505"/>
+                        </a:spcBef>
+                        <a:spcAft>
+                          <a:spcPts val="0"/>
+                        </a:spcAft>
+                      </a:pPr>
+                      <a:r>
+                        <a:rPr lang="es-MX" sz="500" b="0" dirty="0">
+                          <a:solidFill>
+                            <a:schemeClr val="tx1"/>
+                          </a:solidFill>
+                          <a:effectLst/>
+                          <a:latin typeface="Calibri" panose="020F0502020204030204" pitchFamily="34" charset="0"/>
+                          <a:ea typeface="Calibri" panose="020F0502020204030204" pitchFamily="34" charset="0"/>
+                          <a:cs typeface="Times New Roman" panose="02020603050405020304" pitchFamily="18" charset="0"/>
+                        </a:rPr>
+                        <a:t>GLM (Demanda de GN como función de población &amp; PIB)</a:t>
+                      </a:r>
+                    </a:p>
+                  </a:txBody>
+                  <a:tcPr marL="0" marR="0" marT="0" marB="0" anchor="ctr">
+                    <a:lnL w="12700" cap="flat" cmpd="sng" algn="ctr">
+                      <a:solidFill>
+                        <a:schemeClr val="tx1"/>
+                      </a:solidFill>
+                      <a:prstDash val="solid"/>
+                      <a:round/>
+                      <a:headEnd type="none" w="med" len="med"/>
+                      <a:tailEnd type="none" w="med" len="med"/>
+                    </a:lnL>
+                    <a:lnR w="12700" cap="flat" cmpd="sng" algn="ctr">
+                      <a:solidFill>
+                        <a:schemeClr val="tx1"/>
+                      </a:solidFill>
+                      <a:prstDash val="solid"/>
+                      <a:round/>
+                      <a:headEnd type="none" w="med" len="med"/>
+                      <a:tailEnd type="none" w="med" len="med"/>
+                    </a:lnR>
+                    <a:lnT w="12700" cap="flat" cmpd="sng" algn="ctr">
+                      <a:solidFill>
+                        <a:schemeClr val="tx1"/>
+                      </a:solidFill>
+                      <a:prstDash val="solid"/>
+                      <a:round/>
+                      <a:headEnd type="none" w="med" len="med"/>
+                      <a:tailEnd type="none" w="med" len="med"/>
+                    </a:lnT>
+                    <a:lnB w="12700" cap="flat" cmpd="sng" algn="ctr">
+                      <a:solidFill>
+                        <a:schemeClr val="tx1"/>
+                      </a:solidFill>
+                      <a:prstDash val="solid"/>
+                      <a:round/>
+                      <a:headEnd type="none" w="med" len="med"/>
+                      <a:tailEnd type="none" w="med" len="med"/>
+                    </a:lnB>
+                    <a:noFill/>
+                  </a:tcPr>
+                </a:tc>
+                <a:tc>
+                  <a:txBody>
+                    <a:bodyPr/>
+                    <a:lstStyle/>
+                    <a:p>
+                      <a:pPr marL="60325" marR="0">
+                        <a:spcBef>
+                          <a:spcPts val="505"/>
+                        </a:spcBef>
+                        <a:spcAft>
+                          <a:spcPts val="0"/>
+                        </a:spcAft>
+                      </a:pPr>
+                      <a:r>
+                        <a:rPr lang="es-ES" sz="500" b="0" dirty="0">
+                          <a:solidFill>
+                            <a:schemeClr val="tx1"/>
+                          </a:solidFill>
+                          <a:effectLst/>
+                        </a:rPr>
+                        <a:t>14.5%</a:t>
+                      </a:r>
+                      <a:endParaRPr lang="es-MX" sz="500" b="0" dirty="0">
+                        <a:solidFill>
+                          <a:schemeClr val="tx1"/>
+                        </a:solidFill>
+                        <a:effectLst/>
+                        <a:latin typeface="Calibri" panose="020F0502020204030204" pitchFamily="34" charset="0"/>
+                        <a:ea typeface="Calibri" panose="020F0502020204030204" pitchFamily="34" charset="0"/>
+                        <a:cs typeface="Times New Roman" panose="02020603050405020304" pitchFamily="18" charset="0"/>
+                      </a:endParaRPr>
+                    </a:p>
+                  </a:txBody>
+                  <a:tcPr marL="0" marR="0" marT="0" marB="0" anchor="ctr">
+                    <a:lnL w="12700" cap="flat" cmpd="sng" algn="ctr">
+                      <a:solidFill>
+                        <a:schemeClr val="tx1"/>
+                      </a:solidFill>
+                      <a:prstDash val="solid"/>
+                      <a:round/>
+                      <a:headEnd type="none" w="med" len="med"/>
+                      <a:tailEnd type="none" w="med" len="med"/>
+                    </a:lnL>
+                    <a:lnR w="12700" cap="flat" cmpd="sng" algn="ctr">
+                      <a:solidFill>
+                        <a:schemeClr val="tx1"/>
+                      </a:solidFill>
+                      <a:prstDash val="solid"/>
+                      <a:round/>
+                      <a:headEnd type="none" w="med" len="med"/>
+                      <a:tailEnd type="none" w="med" len="med"/>
+                    </a:lnR>
+                    <a:lnT w="12700" cap="flat" cmpd="sng" algn="ctr">
+                      <a:solidFill>
+                        <a:schemeClr val="tx1"/>
+                      </a:solidFill>
+                      <a:prstDash val="solid"/>
+                      <a:round/>
+                      <a:headEnd type="none" w="med" len="med"/>
+                      <a:tailEnd type="none" w="med" len="med"/>
+                    </a:lnT>
+                    <a:lnB w="12700" cap="flat" cmpd="sng" algn="ctr">
+                      <a:solidFill>
+                        <a:schemeClr val="tx1"/>
+                      </a:solidFill>
+                      <a:prstDash val="solid"/>
+                      <a:round/>
+                      <a:headEnd type="none" w="med" len="med"/>
+                      <a:tailEnd type="none" w="med" len="med"/>
+                    </a:lnB>
+                    <a:noFill/>
+                  </a:tcPr>
+                </a:tc>
+                <a:tc rowSpan="2">
+                  <a:txBody>
+                    <a:bodyPr/>
+                    <a:lstStyle/>
+                    <a:p>
+                      <a:pPr marL="63500" marR="86360">
+                        <a:spcBef>
+                          <a:spcPts val="505"/>
+                        </a:spcBef>
+                        <a:spcAft>
+                          <a:spcPts val="0"/>
+                        </a:spcAft>
+                      </a:pPr>
+                      <a:r>
+                        <a:rPr lang="es-MX" sz="500" b="0" dirty="0">
+                          <a:solidFill>
+                            <a:schemeClr val="tx1"/>
+                          </a:solidFill>
+                          <a:effectLst/>
+                          <a:latin typeface="Calibri" panose="020F0502020204030204" pitchFamily="34" charset="0"/>
+                          <a:ea typeface="Calibri" panose="020F0502020204030204" pitchFamily="34" charset="0"/>
+                          <a:cs typeface="Times New Roman" panose="02020603050405020304" pitchFamily="18" charset="0"/>
+                        </a:rPr>
+                        <a:t>Se usó la función Gaussian (</a:t>
+                      </a:r>
+                      <a:r>
+                        <a:rPr lang="es-MX" sz="500" b="0" dirty="0" err="1">
+                          <a:solidFill>
+                            <a:schemeClr val="tx1"/>
+                          </a:solidFill>
+                          <a:effectLst/>
+                          <a:latin typeface="Calibri" panose="020F0502020204030204" pitchFamily="34" charset="0"/>
+                          <a:ea typeface="Calibri" panose="020F0502020204030204" pitchFamily="34" charset="0"/>
+                          <a:cs typeface="Times New Roman" panose="02020603050405020304" pitchFamily="18" charset="0"/>
+                        </a:rPr>
+                        <a:t>identity</a:t>
+                      </a:r>
+                      <a:r>
+                        <a:rPr lang="es-MX" sz="500" b="0" dirty="0">
+                          <a:solidFill>
+                            <a:schemeClr val="tx1"/>
+                          </a:solidFill>
+                          <a:effectLst/>
+                          <a:latin typeface="Calibri" panose="020F0502020204030204" pitchFamily="34" charset="0"/>
+                          <a:ea typeface="Calibri" panose="020F0502020204030204" pitchFamily="34" charset="0"/>
+                          <a:cs typeface="Times New Roman" panose="02020603050405020304" pitchFamily="18" charset="0"/>
+                        </a:rPr>
+                        <a:t>) para GLM “simple”</a:t>
+                      </a:r>
+                    </a:p>
+                  </a:txBody>
+                  <a:tcPr marL="0" marR="0" marT="0" marB="0" anchor="ctr">
+                    <a:lnL w="12700" cap="flat" cmpd="sng" algn="ctr">
+                      <a:solidFill>
+                        <a:schemeClr val="tx1"/>
+                      </a:solidFill>
+                      <a:prstDash val="solid"/>
+                      <a:round/>
+                      <a:headEnd type="none" w="med" len="med"/>
+                      <a:tailEnd type="none" w="med" len="med"/>
+                    </a:lnL>
+                    <a:lnR w="12700" cap="flat" cmpd="sng" algn="ctr">
+                      <a:solidFill>
+                        <a:schemeClr val="tx1"/>
+                      </a:solidFill>
+                      <a:prstDash val="solid"/>
+                      <a:round/>
+                      <a:headEnd type="none" w="med" len="med"/>
+                      <a:tailEnd type="none" w="med" len="med"/>
+                    </a:lnR>
+                    <a:lnT w="12700" cap="flat" cmpd="sng" algn="ctr">
+                      <a:solidFill>
+                        <a:schemeClr val="tx1"/>
+                      </a:solidFill>
+                      <a:prstDash val="solid"/>
+                      <a:round/>
+                      <a:headEnd type="none" w="med" len="med"/>
+                      <a:tailEnd type="none" w="med" len="med"/>
+                    </a:lnT>
+                    <a:lnB w="12700" cap="flat" cmpd="sng" algn="ctr">
+                      <a:solidFill>
+                        <a:schemeClr val="tx1"/>
+                      </a:solidFill>
+                      <a:prstDash val="solid"/>
+                      <a:round/>
+                      <a:headEnd type="none" w="med" len="med"/>
+                      <a:tailEnd type="none" w="med" len="med"/>
+                    </a:lnB>
+                    <a:noFill/>
+                  </a:tcPr>
+                </a:tc>
+                <a:extLst>
+                  <a:ext uri="{0D108BD9-81ED-4DB2-BD59-A6C34878D82A}">
+                    <a16:rowId xmlns:a16="http://schemas.microsoft.com/office/drawing/2014/main" val="186239642"/>
+                  </a:ext>
+                </a:extLst>
+              </a:tr>
+              <a:tr h="165512">
+                <a:tc>
+                  <a:txBody>
+                    <a:bodyPr/>
+                    <a:lstStyle/>
+                    <a:p>
+                      <a:pPr marL="57150" marR="0">
+                        <a:spcBef>
+                          <a:spcPts val="515"/>
+                        </a:spcBef>
+                        <a:spcAft>
+                          <a:spcPts val="0"/>
+                        </a:spcAft>
+                      </a:pPr>
+                      <a:r>
+                        <a:rPr lang="es-MX" sz="500" b="0" dirty="0">
+                          <a:solidFill>
+                            <a:schemeClr val="tx1"/>
+                          </a:solidFill>
+                          <a:effectLst/>
+                          <a:latin typeface="Calibri" panose="020F0502020204030204" pitchFamily="34" charset="0"/>
+                          <a:ea typeface="Calibri" panose="020F0502020204030204" pitchFamily="34" charset="0"/>
+                          <a:cs typeface="Times New Roman" panose="02020603050405020304" pitchFamily="18" charset="0"/>
+                        </a:rPr>
+                        <a:t>GLM (Demanda de GN como función de población)</a:t>
+                      </a:r>
+                    </a:p>
+                  </a:txBody>
+                  <a:tcPr marL="0" marR="0" marT="0" marB="0" anchor="ctr">
+                    <a:lnL w="12700" cap="flat" cmpd="sng" algn="ctr">
+                      <a:solidFill>
+                        <a:schemeClr val="tx1"/>
+                      </a:solidFill>
+                      <a:prstDash val="solid"/>
+                      <a:round/>
+                      <a:headEnd type="none" w="med" len="med"/>
+                      <a:tailEnd type="none" w="med" len="med"/>
+                    </a:lnL>
+                    <a:lnR w="12700" cap="flat" cmpd="sng" algn="ctr">
+                      <a:solidFill>
+                        <a:schemeClr val="tx1"/>
+                      </a:solidFill>
+                      <a:prstDash val="solid"/>
+                      <a:round/>
+                      <a:headEnd type="none" w="med" len="med"/>
+                      <a:tailEnd type="none" w="med" len="med"/>
+                    </a:lnR>
+                    <a:lnT w="12700" cap="flat" cmpd="sng" algn="ctr">
+                      <a:solidFill>
+                        <a:schemeClr val="tx1"/>
+                      </a:solidFill>
+                      <a:prstDash val="solid"/>
+                      <a:round/>
+                      <a:headEnd type="none" w="med" len="med"/>
+                      <a:tailEnd type="none" w="med" len="med"/>
+                    </a:lnT>
+                    <a:lnB w="12700" cap="flat" cmpd="sng" algn="ctr">
+                      <a:solidFill>
+                        <a:schemeClr val="tx1"/>
+                      </a:solidFill>
+                      <a:prstDash val="solid"/>
+                      <a:round/>
+                      <a:headEnd type="none" w="med" len="med"/>
+                      <a:tailEnd type="none" w="med" len="med"/>
+                    </a:lnB>
+                    <a:noFill/>
+                  </a:tcPr>
+                </a:tc>
+                <a:tc>
+                  <a:txBody>
+                    <a:bodyPr/>
+                    <a:lstStyle/>
+                    <a:p>
+                      <a:pPr marL="60325" marR="89535">
+                        <a:spcBef>
+                          <a:spcPts val="515"/>
+                        </a:spcBef>
+                        <a:spcAft>
+                          <a:spcPts val="0"/>
+                        </a:spcAft>
+                      </a:pPr>
+                      <a:r>
+                        <a:rPr lang="es-ES" sz="500" b="0" dirty="0">
+                          <a:solidFill>
+                            <a:schemeClr val="tx1"/>
+                          </a:solidFill>
+                          <a:effectLst/>
+                        </a:rPr>
+                        <a:t>13%</a:t>
+                      </a:r>
+                      <a:endParaRPr lang="es-MX" sz="500" b="0" dirty="0">
+                        <a:solidFill>
+                          <a:schemeClr val="tx1"/>
+                        </a:solidFill>
+                        <a:effectLst/>
+                        <a:latin typeface="Calibri" panose="020F0502020204030204" pitchFamily="34" charset="0"/>
+                        <a:ea typeface="Calibri" panose="020F0502020204030204" pitchFamily="34" charset="0"/>
+                        <a:cs typeface="Times New Roman" panose="02020603050405020304" pitchFamily="18" charset="0"/>
+                      </a:endParaRPr>
+                    </a:p>
+                  </a:txBody>
+                  <a:tcPr marL="0" marR="0" marT="0" marB="0" anchor="ctr">
+                    <a:lnL w="12700" cap="flat" cmpd="sng" algn="ctr">
+                      <a:solidFill>
+                        <a:schemeClr val="tx1"/>
+                      </a:solidFill>
+                      <a:prstDash val="solid"/>
+                      <a:round/>
+                      <a:headEnd type="none" w="med" len="med"/>
+                      <a:tailEnd type="none" w="med" len="med"/>
+                    </a:lnL>
+                    <a:lnR w="12700" cap="flat" cmpd="sng" algn="ctr">
+                      <a:solidFill>
+                        <a:schemeClr val="tx1"/>
+                      </a:solidFill>
+                      <a:prstDash val="solid"/>
+                      <a:round/>
+                      <a:headEnd type="none" w="med" len="med"/>
+                      <a:tailEnd type="none" w="med" len="med"/>
+                    </a:lnR>
+                    <a:lnT w="12700" cap="flat" cmpd="sng" algn="ctr">
+                      <a:solidFill>
+                        <a:schemeClr val="tx1"/>
+                      </a:solidFill>
+                      <a:prstDash val="solid"/>
+                      <a:round/>
+                      <a:headEnd type="none" w="med" len="med"/>
+                      <a:tailEnd type="none" w="med" len="med"/>
+                    </a:lnT>
+                    <a:lnB w="12700" cap="flat" cmpd="sng" algn="ctr">
+                      <a:solidFill>
+                        <a:schemeClr val="tx1"/>
+                      </a:solidFill>
+                      <a:prstDash val="solid"/>
+                      <a:round/>
+                      <a:headEnd type="none" w="med" len="med"/>
+                      <a:tailEnd type="none" w="med" len="med"/>
+                    </a:lnB>
+                    <a:noFill/>
+                  </a:tcPr>
+                </a:tc>
+                <a:tc vMerge="1">
+                  <a:txBody>
+                    <a:bodyPr/>
+                    <a:lstStyle/>
+                    <a:p>
+                      <a:pPr marL="63500" marR="0">
+                        <a:spcBef>
+                          <a:spcPts val="515"/>
+                        </a:spcBef>
+                        <a:spcAft>
+                          <a:spcPts val="0"/>
+                        </a:spcAft>
+                      </a:pPr>
+                      <a:endParaRPr lang="es-MX" sz="500" b="0" dirty="0">
+                        <a:solidFill>
+                          <a:schemeClr val="tx1"/>
+                        </a:solidFill>
+                        <a:effectLst/>
+                        <a:latin typeface="Calibri" panose="020F0502020204030204" pitchFamily="34" charset="0"/>
+                        <a:ea typeface="Calibri" panose="020F0502020204030204" pitchFamily="34" charset="0"/>
+                        <a:cs typeface="Times New Roman" panose="02020603050405020304" pitchFamily="18" charset="0"/>
+                      </a:endParaRPr>
+                    </a:p>
+                  </a:txBody>
+                  <a:tcPr marL="0" marR="0" marT="0" marB="0" anchor="ctr">
+                    <a:lnL w="12700" cap="flat" cmpd="sng" algn="ctr">
+                      <a:solidFill>
+                        <a:schemeClr val="tx1"/>
+                      </a:solidFill>
+                      <a:prstDash val="solid"/>
+                      <a:round/>
+                      <a:headEnd type="none" w="med" len="med"/>
+                      <a:tailEnd type="none" w="med" len="med"/>
+                    </a:lnL>
+                    <a:lnR w="12700" cap="flat" cmpd="sng" algn="ctr">
+                      <a:solidFill>
+                        <a:schemeClr val="tx1"/>
+                      </a:solidFill>
+                      <a:prstDash val="solid"/>
+                      <a:round/>
+                      <a:headEnd type="none" w="med" len="med"/>
+                      <a:tailEnd type="none" w="med" len="med"/>
+                    </a:lnR>
+                    <a:lnT w="12700" cap="flat" cmpd="sng" algn="ctr">
+                      <a:solidFill>
+                        <a:schemeClr val="tx1"/>
+                      </a:solidFill>
+                      <a:prstDash val="solid"/>
+                      <a:round/>
+                      <a:headEnd type="none" w="med" len="med"/>
+                      <a:tailEnd type="none" w="med" len="med"/>
+                    </a:lnT>
+                    <a:lnB w="12700" cap="flat" cmpd="sng" algn="ctr">
+                      <a:solidFill>
+                        <a:schemeClr val="tx1"/>
+                      </a:solidFill>
+                      <a:prstDash val="solid"/>
+                      <a:round/>
+                      <a:headEnd type="none" w="med" len="med"/>
+                      <a:tailEnd type="none" w="med" len="med"/>
+                    </a:lnB>
+                    <a:noFill/>
+                  </a:tcPr>
+                </a:tc>
+                <a:extLst>
+                  <a:ext uri="{0D108BD9-81ED-4DB2-BD59-A6C34878D82A}">
+                    <a16:rowId xmlns:a16="http://schemas.microsoft.com/office/drawing/2014/main" val="2474187109"/>
+                  </a:ext>
+                </a:extLst>
+              </a:tr>
+            </a:tbl>
+          </a:graphicData>
+        </a:graphic>
+      </p:graphicFrame>
+      <p:pic>
+        <p:nvPicPr>
+          <p:cNvPr id="29" name="Picture 28">
+            <a:extLst>
+              <a:ext uri="{FF2B5EF4-FFF2-40B4-BE49-F238E27FC236}">
+                <a16:creationId xmlns:a16="http://schemas.microsoft.com/office/drawing/2014/main" id="{7D11C574-02AA-0CE4-D5E8-3638F6E7B7A6}"/>
+              </a:ext>
+            </a:extLst>
+          </p:cNvPr>
+          <p:cNvPicPr>
+            <a:picLocks noChangeAspect="1"/>
+          </p:cNvPicPr>
+          <p:nvPr/>
+        </p:nvPicPr>
+        <p:blipFill>
+          <a:blip r:embed="rId11"/>
+          <a:stretch>
+            <a:fillRect/>
+          </a:stretch>
+        </p:blipFill>
+        <p:spPr>
+          <a:xfrm>
+            <a:off x="828330" y="12514502"/>
+            <a:ext cx="1362738" cy="841004"/>
+          </a:xfrm>
+          <a:prstGeom prst="rect">
+            <a:avLst/>
+          </a:prstGeom>
+        </p:spPr>
+      </p:pic>
+      <p:pic>
+        <p:nvPicPr>
+          <p:cNvPr id="30" name="Picture 29">
+            <a:extLst>
+              <a:ext uri="{FF2B5EF4-FFF2-40B4-BE49-F238E27FC236}">
+                <a16:creationId xmlns:a16="http://schemas.microsoft.com/office/drawing/2014/main" id="{B31A265C-E064-621B-AC24-CEB05D6A73D6}"/>
+              </a:ext>
+            </a:extLst>
+          </p:cNvPr>
+          <p:cNvPicPr>
+            <a:picLocks noChangeAspect="1"/>
+          </p:cNvPicPr>
+          <p:nvPr/>
+        </p:nvPicPr>
+        <p:blipFill>
+          <a:blip r:embed="rId12"/>
+          <a:stretch>
+            <a:fillRect/>
+          </a:stretch>
+        </p:blipFill>
+        <p:spPr>
+          <a:xfrm>
+            <a:off x="2700913" y="12483201"/>
+            <a:ext cx="1362738" cy="841004"/>
+          </a:xfrm>
+          <a:prstGeom prst="rect">
+            <a:avLst/>
+          </a:prstGeom>
+        </p:spPr>
+      </p:pic>
     </p:spTree>
     <p:extLst>
       <p:ext uri="{BB962C8B-B14F-4D97-AF65-F5344CB8AC3E}">

</xml_diff>